<commit_message>
presentation update report init
</commit_message>
<xml_diff>
--- a/Präsentation/presentation.pptx
+++ b/Präsentation/presentation.pptx
@@ -24,6 +24,8 @@
     <p:sldId id="269" r:id="rId21"/>
     <p:sldId id="270" r:id="rId22"/>
     <p:sldId id="271" r:id="rId23"/>
+    <p:sldId id="272" r:id="rId24"/>
+    <p:sldId id="273" r:id="rId25"/>
   </p:sldIdLst>
   <p:sldSz cx="9144000" cy="6858000"/>
   <p:notesSz cx="6858000" cy="9144000"/>
@@ -570,11 +572,91 @@
                 </a:solidFill>
               </a:defRPr>
             </a:lvl1pPr>
+            <a:lvl2pPr marL="0" indent="457200" algn="ctr">
+              <a:spcBef>
+                <a:spcPts val="1000"/>
+              </a:spcBef>
+              <a:buClrTx/>
+              <a:buSzTx/>
+              <a:buFontTx/>
+              <a:buNone/>
+              <a:defRPr b="1" sz="4400">
+                <a:solidFill>
+                  <a:srgbClr val="1D3455"/>
+                </a:solidFill>
+              </a:defRPr>
+            </a:lvl2pPr>
+            <a:lvl3pPr marL="0" indent="914400" algn="ctr">
+              <a:spcBef>
+                <a:spcPts val="1000"/>
+              </a:spcBef>
+              <a:buClrTx/>
+              <a:buSzTx/>
+              <a:buFontTx/>
+              <a:buNone/>
+              <a:defRPr b="1" sz="4400">
+                <a:solidFill>
+                  <a:srgbClr val="1D3455"/>
+                </a:solidFill>
+              </a:defRPr>
+            </a:lvl3pPr>
+            <a:lvl4pPr marL="0" indent="1371600" algn="ctr">
+              <a:spcBef>
+                <a:spcPts val="1000"/>
+              </a:spcBef>
+              <a:buClrTx/>
+              <a:buSzTx/>
+              <a:buFontTx/>
+              <a:buNone/>
+              <a:defRPr b="1" sz="4400">
+                <a:solidFill>
+                  <a:srgbClr val="1D3455"/>
+                </a:solidFill>
+              </a:defRPr>
+            </a:lvl4pPr>
+            <a:lvl5pPr marL="0" indent="1828800" algn="ctr">
+              <a:spcBef>
+                <a:spcPts val="1000"/>
+              </a:spcBef>
+              <a:buClrTx/>
+              <a:buSzTx/>
+              <a:buFontTx/>
+              <a:buNone/>
+              <a:defRPr b="1" sz="4400">
+                <a:solidFill>
+                  <a:srgbClr val="1D3455"/>
+                </a:solidFill>
+              </a:defRPr>
+            </a:lvl5pPr>
           </a:lstStyle>
           <a:p>
             <a:pPr/>
             <a:r>
-              <a:t>Click to add subtitle</a:t>
+              <a:t>Body Level One</a:t>
+            </a:r>
+          </a:p>
+          <a:p>
+            <a:pPr lvl="1"/>
+            <a:r>
+              <a:t>Body Level Two</a:t>
+            </a:r>
+          </a:p>
+          <a:p>
+            <a:pPr lvl="2"/>
+            <a:r>
+              <a:t>Body Level Three</a:t>
+            </a:r>
+          </a:p>
+          <a:p>
+            <a:pPr lvl="3"/>
+            <a:r>
+              <a:t>Body Level Four</a:t>
+            </a:r>
+          </a:p>
+          <a:p>
+            <a:pPr lvl="4"/>
+            <a:r>
+              <a:t>Body Level Five</a:t>
             </a:r>
           </a:p>
         </p:txBody>
@@ -812,19 +894,31 @@
           <a:p>
             <a:pPr/>
             <a:r>
-              <a:t>Click to add text</a:t>
+              <a:t>Body Level One</a:t>
             </a:r>
           </a:p>
           <a:p>
             <a:pPr lvl="1"/>
             <a:r>
-              <a:t>Second level</a:t>
+              <a:t>Body Level Two</a:t>
             </a:r>
           </a:p>
           <a:p>
             <a:pPr lvl="2"/>
             <a:r>
-              <a:t>Third level</a:t>
+              <a:t>Body Level Three</a:t>
+            </a:r>
+          </a:p>
+          <a:p>
+            <a:pPr lvl="3"/>
+            <a:r>
+              <a:t>Body Level Four</a:t>
+            </a:r>
+          </a:p>
+          <a:p>
+            <a:pPr lvl="4"/>
+            <a:r>
+              <a:t>Body Level Five</a:t>
             </a:r>
           </a:p>
         </p:txBody>
@@ -848,7 +942,7 @@
           <a:p>
             <a:pPr/>
             <a:r>
-              <a:t>Click to edit Master title style</a:t>
+              <a:t>Title Text</a:t>
             </a:r>
           </a:p>
         </p:txBody>
@@ -920,23 +1014,38 @@
         </p:spPr>
         <p:txBody>
           <a:bodyPr/>
-          <a:lstStyle/>
+          <a:lstStyle>
+            <a:lvl4pPr marL="1727200" indent="-355600"/>
+            <a:lvl5pPr marL="2184400" indent="-355600"/>
+          </a:lstStyle>
           <a:p>
             <a:pPr/>
             <a:r>
-              <a:t>Click to add text</a:t>
+              <a:t>Body Level One</a:t>
             </a:r>
           </a:p>
           <a:p>
             <a:pPr lvl="1"/>
             <a:r>
-              <a:t>Second level</a:t>
+              <a:t>Body Level Two</a:t>
             </a:r>
           </a:p>
           <a:p>
             <a:pPr lvl="2"/>
             <a:r>
-              <a:t>Third level</a:t>
+              <a:t>Body Level Three</a:t>
+            </a:r>
+          </a:p>
+          <a:p>
+            <a:pPr lvl="3"/>
+            <a:r>
+              <a:t>Body Level Four</a:t>
+            </a:r>
+          </a:p>
+          <a:p>
+            <a:pPr lvl="4"/>
+            <a:r>
+              <a:t>Body Level Five</a:t>
             </a:r>
           </a:p>
         </p:txBody>
@@ -1005,7 +1114,7 @@
           <a:p>
             <a:pPr/>
             <a:r>
-              <a:t>Click to edit Master title style</a:t>
+              <a:t>Title Text</a:t>
             </a:r>
           </a:p>
         </p:txBody>
@@ -1077,7 +1186,7 @@
           <a:p>
             <a:pPr/>
             <a:r>
-              <a:t>Click to edit Master title style</a:t>
+              <a:t>Title Text</a:t>
             </a:r>
           </a:p>
         </p:txBody>
@@ -1362,10 +1471,6 @@
           </p:nvPr>
         </p:nvSpPr>
         <p:spPr>
-          <a:xfrm>
-            <a:off x="8422818" y="6568201"/>
-            <a:ext cx="263983" cy="269241"/>
-          </a:xfrm>
           <a:prstGeom prst="rect">
             <a:avLst/>
           </a:prstGeom>
@@ -1596,19 +1701,31 @@
           <a:p>
             <a:pPr/>
             <a:r>
-              <a:t>Click to add text</a:t>
+              <a:t>Body Level One</a:t>
             </a:r>
           </a:p>
           <a:p>
             <a:pPr lvl="1"/>
             <a:r>
-              <a:t>Second level</a:t>
+              <a:t>Body Level Two</a:t>
             </a:r>
           </a:p>
           <a:p>
             <a:pPr lvl="2"/>
             <a:r>
-              <a:t>Third level</a:t>
+              <a:t>Body Level Three</a:t>
+            </a:r>
+          </a:p>
+          <a:p>
+            <a:pPr lvl="3"/>
+            <a:r>
+              <a:t>Body Level Four</a:t>
+            </a:r>
+          </a:p>
+          <a:p>
+            <a:pPr lvl="4"/>
+            <a:r>
+              <a:t>Body Level Five</a:t>
             </a:r>
           </a:p>
         </p:txBody>
@@ -1646,7 +1763,7 @@
           <a:p>
             <a:pPr/>
             <a:r>
-              <a:t>Click to edit Master title style</a:t>
+              <a:t>Title Text</a:t>
             </a:r>
           </a:p>
         </p:txBody>
@@ -2536,8 +2653,8 @@
         </p:nvSpPr>
         <p:spPr>
           <a:xfrm>
-            <a:off x="179511" y="449375"/>
-            <a:ext cx="8784978" cy="2184650"/>
+            <a:off x="179511" y="449376"/>
+            <a:ext cx="8784978" cy="2184649"/>
           </a:xfrm>
           <a:prstGeom prst="rect">
             <a:avLst/>
@@ -2708,7 +2825,7 @@
       </p:grpSpPr>
       <p:sp>
         <p:nvSpPr>
-          <p:cNvPr id="112" name="Shape 112"/>
+          <p:cNvPr id="106" name="Shape 106"/>
           <p:cNvSpPr/>
           <p:nvPr>
             <p:ph type="title"/>
@@ -2732,17 +2849,13 @@
       </p:sp>
       <p:sp>
         <p:nvSpPr>
-          <p:cNvPr id="113" name="Shape 113"/>
+          <p:cNvPr id="107" name="Shape 107"/>
           <p:cNvSpPr/>
           <p:nvPr>
             <p:ph type="sldNum" sz="quarter" idx="4294967295"/>
           </p:nvPr>
         </p:nvSpPr>
         <p:spPr>
-          <a:xfrm>
-            <a:off x="8422818" y="6568201"/>
-            <a:ext cx="263983" cy="269241"/>
-          </a:xfrm>
           <a:prstGeom prst="rect">
             <a:avLst/>
           </a:prstGeom>
@@ -2763,7 +2876,7 @@
       </p:sp>
       <p:pic>
         <p:nvPicPr>
-          <p:cNvPr id="114" name="kd-table-4.png"/>
+          <p:cNvPr id="108" name="kd-table-2.png"/>
           <p:cNvPicPr>
             <a:picLocks noChangeAspect="1"/>
           </p:cNvPicPr>
@@ -2792,7 +2905,7 @@
       </p:pic>
       <p:pic>
         <p:nvPicPr>
-          <p:cNvPr id="115" name="kd-tree-4.png"/>
+          <p:cNvPr id="109" name="kd-tree-2.png"/>
           <p:cNvPicPr>
             <a:picLocks noChangeAspect="1"/>
           </p:cNvPicPr>
@@ -2808,8 +2921,8 @@
         </p:blipFill>
         <p:spPr>
           <a:xfrm>
-            <a:off x="0" y="2597784"/>
-            <a:ext cx="4445001" cy="1662431"/>
+            <a:off x="5989" y="2691129"/>
+            <a:ext cx="4445001" cy="1475741"/>
           </a:xfrm>
           <a:prstGeom prst="rect">
             <a:avLst/>
@@ -2821,7 +2934,7 @@
       </p:pic>
       <p:sp>
         <p:nvSpPr>
-          <p:cNvPr id="116" name="Shape 116"/>
+          <p:cNvPr id="110" name="Shape 110"/>
           <p:cNvSpPr/>
           <p:nvPr>
             <p:ph type="body" idx="1"/>
@@ -2848,7 +2961,7 @@
             </a:r>
             <a:br/>
             <a:r>
-              <a:t>(7,2) (5,4) (2,3) </a:t>
+              <a:t>(7,2) </a:t>
             </a:r>
             <a:r>
               <a:rPr>
@@ -2856,10 +2969,10 @@
                   <a:srgbClr val="942192"/>
                 </a:solidFill>
               </a:rPr>
-              <a:t>(9,6)</a:t>
-            </a:r>
-            <a:r>
-              <a:t> (4,7) (8,1)</a:t>
+              <a:t>(5,4)</a:t>
+            </a:r>
+            <a:r>
+              <a:t> (2,3) (9,6) (4,7) (8,1)</a:t>
             </a:r>
           </a:p>
         </p:txBody>
@@ -2892,7 +3005,7 @@
       </p:grpSpPr>
       <p:sp>
         <p:nvSpPr>
-          <p:cNvPr id="118" name="Shape 118"/>
+          <p:cNvPr id="112" name="Shape 112"/>
           <p:cNvSpPr/>
           <p:nvPr>
             <p:ph type="title"/>
@@ -2916,17 +3029,13 @@
       </p:sp>
       <p:sp>
         <p:nvSpPr>
-          <p:cNvPr id="119" name="Shape 119"/>
+          <p:cNvPr id="113" name="Shape 113"/>
           <p:cNvSpPr/>
           <p:nvPr>
             <p:ph type="sldNum" sz="quarter" idx="4294967295"/>
           </p:nvPr>
         </p:nvSpPr>
         <p:spPr>
-          <a:xfrm>
-            <a:off x="8422818" y="6568201"/>
-            <a:ext cx="263983" cy="269241"/>
-          </a:xfrm>
           <a:prstGeom prst="rect">
             <a:avLst/>
           </a:prstGeom>
@@ -2947,7 +3056,7 @@
       </p:sp>
       <p:pic>
         <p:nvPicPr>
-          <p:cNvPr id="120" name="kd-table-5.png"/>
+          <p:cNvPr id="114" name="kd-table-3.png"/>
           <p:cNvPicPr>
             <a:picLocks noChangeAspect="1"/>
           </p:cNvPicPr>
@@ -2976,7 +3085,7 @@
       </p:pic>
       <p:pic>
         <p:nvPicPr>
-          <p:cNvPr id="121" name="kd-tree-5.png"/>
+          <p:cNvPr id="115" name="kd-tree-3.png"/>
           <p:cNvPicPr>
             <a:picLocks noChangeAspect="1"/>
           </p:cNvPicPr>
@@ -2992,8 +3101,8 @@
         </p:blipFill>
         <p:spPr>
           <a:xfrm>
-            <a:off x="0" y="2597785"/>
-            <a:ext cx="4445000" cy="1662430"/>
+            <a:off x="0" y="2322195"/>
+            <a:ext cx="4445000" cy="2213611"/>
           </a:xfrm>
           <a:prstGeom prst="rect">
             <a:avLst/>
@@ -3005,7 +3114,7 @@
       </p:pic>
       <p:sp>
         <p:nvSpPr>
-          <p:cNvPr id="122" name="Shape 122"/>
+          <p:cNvPr id="116" name="Shape 116"/>
           <p:cNvSpPr/>
           <p:nvPr>
             <p:ph type="body" idx="1"/>
@@ -3032,7 +3141,7 @@
             </a:r>
             <a:br/>
             <a:r>
-              <a:t>(7,2) (5,4) (2,3) (9,6) </a:t>
+              <a:t>(7,2) (5,4) </a:t>
             </a:r>
             <a:r>
               <a:rPr>
@@ -3040,10 +3149,10 @@
                   <a:srgbClr val="942192"/>
                 </a:solidFill>
               </a:rPr>
-              <a:t>(4,7)</a:t>
-            </a:r>
-            <a:r>
-              <a:t> (8,1)</a:t>
+              <a:t>(2,3)</a:t>
+            </a:r>
+            <a:r>
+              <a:t> (9,6) (4,7) (8,1)</a:t>
             </a:r>
           </a:p>
         </p:txBody>
@@ -3076,7 +3185,7 @@
       </p:grpSpPr>
       <p:sp>
         <p:nvSpPr>
-          <p:cNvPr id="124" name="Shape 124"/>
+          <p:cNvPr id="118" name="Shape 118"/>
           <p:cNvSpPr/>
           <p:nvPr>
             <p:ph type="title"/>
@@ -3100,17 +3209,13 @@
       </p:sp>
       <p:sp>
         <p:nvSpPr>
-          <p:cNvPr id="125" name="Shape 125"/>
+          <p:cNvPr id="119" name="Shape 119"/>
           <p:cNvSpPr/>
           <p:nvPr>
             <p:ph type="sldNum" sz="quarter" idx="4294967295"/>
           </p:nvPr>
         </p:nvSpPr>
         <p:spPr>
-          <a:xfrm>
-            <a:off x="8422818" y="6568201"/>
-            <a:ext cx="263983" cy="269241"/>
-          </a:xfrm>
           <a:prstGeom prst="rect">
             <a:avLst/>
           </a:prstGeom>
@@ -3131,7 +3236,7 @@
       </p:sp>
       <p:pic>
         <p:nvPicPr>
-          <p:cNvPr id="126" name="kd-table-6.png"/>
+          <p:cNvPr id="120" name="kd-table-4.png"/>
           <p:cNvPicPr>
             <a:picLocks noChangeAspect="1"/>
           </p:cNvPicPr>
@@ -3160,7 +3265,7 @@
       </p:pic>
       <p:pic>
         <p:nvPicPr>
-          <p:cNvPr id="127" name="kd-tree-6.png"/>
+          <p:cNvPr id="121" name="kd-tree-4.png"/>
           <p:cNvPicPr>
             <a:picLocks noChangeAspect="1"/>
           </p:cNvPicPr>
@@ -3189,7 +3294,7 @@
       </p:pic>
       <p:sp>
         <p:nvSpPr>
-          <p:cNvPr id="128" name="Shape 128"/>
+          <p:cNvPr id="122" name="Shape 122"/>
           <p:cNvSpPr/>
           <p:nvPr>
             <p:ph type="body" idx="1"/>
@@ -3216,7 +3321,7 @@
             </a:r>
             <a:br/>
             <a:r>
-              <a:t>(7,2) (5,4) (2,3) (9,6) (4,7) </a:t>
+              <a:t>(7,2) (5,4) (2,3) </a:t>
             </a:r>
             <a:r>
               <a:rPr>
@@ -3224,7 +3329,10 @@
                   <a:srgbClr val="942192"/>
                 </a:solidFill>
               </a:rPr>
-              <a:t>(8,1)</a:t>
+              <a:t>(9,6)</a:t>
+            </a:r>
+            <a:r>
+              <a:t> (4,7) (8,1)</a:t>
             </a:r>
           </a:p>
         </p:txBody>
@@ -3257,7 +3365,7 @@
       </p:grpSpPr>
       <p:sp>
         <p:nvSpPr>
-          <p:cNvPr id="130" name="Shape 130"/>
+          <p:cNvPr id="124" name="Shape 124"/>
           <p:cNvSpPr/>
           <p:nvPr>
             <p:ph type="title"/>
@@ -3281,17 +3389,13 @@
       </p:sp>
       <p:sp>
         <p:nvSpPr>
-          <p:cNvPr id="131" name="Shape 131"/>
+          <p:cNvPr id="125" name="Shape 125"/>
           <p:cNvSpPr/>
           <p:nvPr>
             <p:ph type="sldNum" sz="quarter" idx="4294967295"/>
           </p:nvPr>
         </p:nvSpPr>
         <p:spPr>
-          <a:xfrm>
-            <a:off x="8422818" y="6568201"/>
-            <a:ext cx="263983" cy="269241"/>
-          </a:xfrm>
           <a:prstGeom prst="rect">
             <a:avLst/>
           </a:prstGeom>
@@ -3312,7 +3416,7 @@
       </p:sp>
       <p:pic>
         <p:nvPicPr>
-          <p:cNvPr id="132" name="kd-table-6.png"/>
+          <p:cNvPr id="126" name="kd-table-5.png"/>
           <p:cNvPicPr>
             <a:picLocks noChangeAspect="1"/>
           </p:cNvPicPr>
@@ -3341,7 +3445,7 @@
       </p:pic>
       <p:pic>
         <p:nvPicPr>
-          <p:cNvPr id="133" name="kd-tree-6.png"/>
+          <p:cNvPr id="127" name="kd-tree-5.png"/>
           <p:cNvPicPr>
             <a:picLocks noChangeAspect="1"/>
           </p:cNvPicPr>
@@ -3370,7 +3474,7 @@
       </p:pic>
       <p:sp>
         <p:nvSpPr>
-          <p:cNvPr id="134" name="Shape 134"/>
+          <p:cNvPr id="128" name="Shape 128"/>
           <p:cNvSpPr/>
           <p:nvPr>
             <p:ph type="body" idx="1"/>
@@ -3397,7 +3501,18 @@
             </a:r>
             <a:br/>
             <a:r>
-              <a:t>(7,2) (5,4) (2,3) (9,6) (4,7) (8,1)</a:t>
+              <a:t>(7,2) (5,4) (2,3) (9,6) </a:t>
+            </a:r>
+            <a:r>
+              <a:rPr>
+                <a:solidFill>
+                  <a:srgbClr val="942192"/>
+                </a:solidFill>
+              </a:rPr>
+              <a:t>(4,7)</a:t>
+            </a:r>
+            <a:r>
+              <a:t> (8,1)</a:t>
             </a:r>
           </a:p>
         </p:txBody>
@@ -3430,28 +3545,7 @@
       </p:grpSpPr>
       <p:sp>
         <p:nvSpPr>
-          <p:cNvPr id="136" name="Shape 136"/>
-          <p:cNvSpPr/>
-          <p:nvPr>
-            <p:ph type="body" idx="1"/>
-          </p:nvPr>
-        </p:nvSpPr>
-        <p:spPr>
-          <a:prstGeom prst="rect">
-            <a:avLst/>
-          </a:prstGeom>
-        </p:spPr>
-        <p:txBody>
-          <a:bodyPr/>
-          <a:lstStyle/>
-          <a:p>
-            <a:pPr/>
-          </a:p>
-        </p:txBody>
-      </p:sp>
-      <p:sp>
-        <p:nvSpPr>
-          <p:cNvPr id="137" name="Shape 137"/>
+          <p:cNvPr id="130" name="Shape 130"/>
           <p:cNvSpPr/>
           <p:nvPr>
             <p:ph type="title"/>
@@ -3468,14 +3562,14 @@
           <a:p>
             <a:pPr/>
             <a:r>
-              <a:t>Appropriate parallelization of algorithms</a:t>
-            </a:r>
-          </a:p>
-        </p:txBody>
-      </p:sp>
-      <p:sp>
-        <p:nvSpPr>
-          <p:cNvPr id="138" name="Shape 138"/>
+              <a:t>KD-Tree</a:t>
+            </a:r>
+          </a:p>
+        </p:txBody>
+      </p:sp>
+      <p:sp>
+        <p:nvSpPr>
+          <p:cNvPr id="131" name="Shape 131"/>
           <p:cNvSpPr/>
           <p:nvPr>
             <p:ph type="sldNum" sz="quarter" idx="4294967295"/>
@@ -3497,6 +3591,106 @@
           <a:p>
             <a:pPr/>
             <a:fld id="{86CB4B4D-7CA3-9044-876B-883B54F8677D}" type="slidenum"/>
+          </a:p>
+        </p:txBody>
+      </p:sp>
+      <p:pic>
+        <p:nvPicPr>
+          <p:cNvPr id="132" name="kd-table-6.png"/>
+          <p:cNvPicPr>
+            <a:picLocks noChangeAspect="1"/>
+          </p:cNvPicPr>
+          <p:nvPr/>
+        </p:nvPicPr>
+        <p:blipFill>
+          <a:blip r:embed="rId2">
+            <a:extLst/>
+          </a:blip>
+          <a:stretch>
+            <a:fillRect/>
+          </a:stretch>
+        </p:blipFill>
+        <p:spPr>
+          <a:xfrm>
+            <a:off x="4694521" y="1206500"/>
+            <a:ext cx="4445001" cy="4445000"/>
+          </a:xfrm>
+          <a:prstGeom prst="rect">
+            <a:avLst/>
+          </a:prstGeom>
+          <a:ln w="12700">
+            <a:miter lim="400000"/>
+          </a:ln>
+        </p:spPr>
+      </p:pic>
+      <p:pic>
+        <p:nvPicPr>
+          <p:cNvPr id="133" name="kd-tree-6.png"/>
+          <p:cNvPicPr>
+            <a:picLocks noChangeAspect="1"/>
+          </p:cNvPicPr>
+          <p:nvPr/>
+        </p:nvPicPr>
+        <p:blipFill>
+          <a:blip r:embed="rId3">
+            <a:extLst/>
+          </a:blip>
+          <a:stretch>
+            <a:fillRect/>
+          </a:stretch>
+        </p:blipFill>
+        <p:spPr>
+          <a:xfrm>
+            <a:off x="0" y="2597785"/>
+            <a:ext cx="4445000" cy="1662430"/>
+          </a:xfrm>
+          <a:prstGeom prst="rect">
+            <a:avLst/>
+          </a:prstGeom>
+          <a:ln w="12700">
+            <a:miter lim="400000"/>
+          </a:ln>
+        </p:spPr>
+      </p:pic>
+      <p:sp>
+        <p:nvSpPr>
+          <p:cNvPr id="134" name="Shape 134"/>
+          <p:cNvSpPr/>
+          <p:nvPr>
+            <p:ph type="body" idx="1"/>
+          </p:nvPr>
+        </p:nvSpPr>
+        <p:spPr>
+          <a:prstGeom prst="rect">
+            <a:avLst/>
+          </a:prstGeom>
+        </p:spPr>
+        <p:txBody>
+          <a:bodyPr/>
+          <a:lstStyle/>
+          <a:p>
+            <a:pPr marL="0" indent="0">
+              <a:buClrTx/>
+              <a:buSzTx/>
+              <a:buFontTx/>
+              <a:buNone/>
+              <a:defRPr sz="2500"/>
+            </a:pPr>
+            <a:r>
+              <a:t>Inserting 2D (x,y) coordinates:</a:t>
+            </a:r>
+            <a:br/>
+            <a:r>
+              <a:t>(7,2) (5,4) (2,3) (9,6) (4,7) </a:t>
+            </a:r>
+            <a:r>
+              <a:rPr>
+                <a:solidFill>
+                  <a:srgbClr val="942192"/>
+                </a:solidFill>
+              </a:rPr>
+              <a:t>(8,1)</a:t>
+            </a:r>
           </a:p>
         </p:txBody>
       </p:sp>
@@ -3528,28 +3722,7 @@
       </p:grpSpPr>
       <p:sp>
         <p:nvSpPr>
-          <p:cNvPr id="140" name="Shape 140"/>
-          <p:cNvSpPr/>
-          <p:nvPr>
-            <p:ph type="body" idx="1"/>
-          </p:nvPr>
-        </p:nvSpPr>
-        <p:spPr>
-          <a:prstGeom prst="rect">
-            <a:avLst/>
-          </a:prstGeom>
-        </p:spPr>
-        <p:txBody>
-          <a:bodyPr/>
-          <a:lstStyle/>
-          <a:p>
-            <a:pPr/>
-          </a:p>
-        </p:txBody>
-      </p:sp>
-      <p:sp>
-        <p:nvSpPr>
-          <p:cNvPr id="141" name="Shape 141"/>
+          <p:cNvPr id="136" name="Shape 136"/>
           <p:cNvSpPr/>
           <p:nvPr>
             <p:ph type="title"/>
@@ -3566,14 +3739,14 @@
           <a:p>
             <a:pPr/>
             <a:r>
-              <a:t>Libraries and resources to be mentioned</a:t>
-            </a:r>
-          </a:p>
-        </p:txBody>
-      </p:sp>
-      <p:sp>
-        <p:nvSpPr>
-          <p:cNvPr id="142" name="Shape 142"/>
+              <a:t>KD-Tree</a:t>
+            </a:r>
+          </a:p>
+        </p:txBody>
+      </p:sp>
+      <p:sp>
+        <p:nvSpPr>
+          <p:cNvPr id="137" name="Shape 137"/>
           <p:cNvSpPr/>
           <p:nvPr>
             <p:ph type="sldNum" sz="quarter" idx="4294967295"/>
@@ -3595,6 +3768,98 @@
           <a:p>
             <a:pPr/>
             <a:fld id="{86CB4B4D-7CA3-9044-876B-883B54F8677D}" type="slidenum"/>
+          </a:p>
+        </p:txBody>
+      </p:sp>
+      <p:pic>
+        <p:nvPicPr>
+          <p:cNvPr id="138" name="kd-table-6.png"/>
+          <p:cNvPicPr>
+            <a:picLocks noChangeAspect="1"/>
+          </p:cNvPicPr>
+          <p:nvPr/>
+        </p:nvPicPr>
+        <p:blipFill>
+          <a:blip r:embed="rId2">
+            <a:extLst/>
+          </a:blip>
+          <a:stretch>
+            <a:fillRect/>
+          </a:stretch>
+        </p:blipFill>
+        <p:spPr>
+          <a:xfrm>
+            <a:off x="4694521" y="1206500"/>
+            <a:ext cx="4445001" cy="4445000"/>
+          </a:xfrm>
+          <a:prstGeom prst="rect">
+            <a:avLst/>
+          </a:prstGeom>
+          <a:ln w="12700">
+            <a:miter lim="400000"/>
+          </a:ln>
+        </p:spPr>
+      </p:pic>
+      <p:pic>
+        <p:nvPicPr>
+          <p:cNvPr id="139" name="kd-tree-6.png"/>
+          <p:cNvPicPr>
+            <a:picLocks noChangeAspect="1"/>
+          </p:cNvPicPr>
+          <p:nvPr/>
+        </p:nvPicPr>
+        <p:blipFill>
+          <a:blip r:embed="rId3">
+            <a:extLst/>
+          </a:blip>
+          <a:stretch>
+            <a:fillRect/>
+          </a:stretch>
+        </p:blipFill>
+        <p:spPr>
+          <a:xfrm>
+            <a:off x="0" y="2597785"/>
+            <a:ext cx="4445000" cy="1662430"/>
+          </a:xfrm>
+          <a:prstGeom prst="rect">
+            <a:avLst/>
+          </a:prstGeom>
+          <a:ln w="12700">
+            <a:miter lim="400000"/>
+          </a:ln>
+        </p:spPr>
+      </p:pic>
+      <p:sp>
+        <p:nvSpPr>
+          <p:cNvPr id="140" name="Shape 140"/>
+          <p:cNvSpPr/>
+          <p:nvPr>
+            <p:ph type="body" idx="1"/>
+          </p:nvPr>
+        </p:nvSpPr>
+        <p:spPr>
+          <a:prstGeom prst="rect">
+            <a:avLst/>
+          </a:prstGeom>
+        </p:spPr>
+        <p:txBody>
+          <a:bodyPr/>
+          <a:lstStyle/>
+          <a:p>
+            <a:pPr marL="0" indent="0">
+              <a:buClrTx/>
+              <a:buSzTx/>
+              <a:buFontTx/>
+              <a:buNone/>
+              <a:defRPr sz="2500"/>
+            </a:pPr>
+            <a:r>
+              <a:t>Inserting 2D (x,y) coordinates:</a:t>
+            </a:r>
+            <a:br/>
+            <a:r>
+              <a:t>(7,2) (5,4) (2,3) (9,6) (4,7) (8,1)</a:t>
+            </a:r>
           </a:p>
         </p:txBody>
       </p:sp>
@@ -3626,7 +3891,7 @@
       </p:grpSpPr>
       <p:sp>
         <p:nvSpPr>
-          <p:cNvPr id="144" name="Shape 144"/>
+          <p:cNvPr id="142" name="Shape 142"/>
           <p:cNvSpPr/>
           <p:nvPr>
             <p:ph type="body" idx="1"/>
@@ -3647,7 +3912,203 @@
       </p:sp>
       <p:sp>
         <p:nvSpPr>
-          <p:cNvPr id="145" name="Shape 145"/>
+          <p:cNvPr id="143" name="Shape 143"/>
+          <p:cNvSpPr/>
+          <p:nvPr>
+            <p:ph type="title"/>
+          </p:nvPr>
+        </p:nvSpPr>
+        <p:spPr>
+          <a:prstGeom prst="rect">
+            <a:avLst/>
+          </a:prstGeom>
+        </p:spPr>
+        <p:txBody>
+          <a:bodyPr/>
+          <a:lstStyle/>
+          <a:p>
+            <a:pPr/>
+            <a:r>
+              <a:t>Appropriate parallelization of algorithms</a:t>
+            </a:r>
+          </a:p>
+        </p:txBody>
+      </p:sp>
+      <p:sp>
+        <p:nvSpPr>
+          <p:cNvPr id="144" name="Shape 144"/>
+          <p:cNvSpPr/>
+          <p:nvPr>
+            <p:ph type="sldNum" sz="quarter" idx="4294967295"/>
+          </p:nvPr>
+        </p:nvSpPr>
+        <p:spPr>
+          <a:prstGeom prst="rect">
+            <a:avLst/>
+          </a:prstGeom>
+          <a:extLst>
+            <a:ext uri="{C572A759-6A51-4108-AA02-DFA0A04FC94B}">
+              <ma14:wrappingTextBoxFlag xmlns:ma14="http://schemas.microsoft.com/office/mac/drawingml/2011/main" val="1"/>
+            </a:ext>
+          </a:extLst>
+        </p:spPr>
+        <p:txBody>
+          <a:bodyPr/>
+          <a:lstStyle/>
+          <a:p>
+            <a:pPr/>
+            <a:fld id="{86CB4B4D-7CA3-9044-876B-883B54F8677D}" type="slidenum"/>
+          </a:p>
+        </p:txBody>
+      </p:sp>
+    </p:spTree>
+  </p:cSld>
+  <p:clrMapOvr>
+    <a:masterClrMapping/>
+  </p:clrMapOvr>
+  <p:transition xmlns:p14="http://schemas.microsoft.com/office/powerpoint/2010/main" spd="med" advClick="1" p14:dur="1000"/>
+</p:sld>
+</file>
+
+<file path=ppt/slides/slide17.xml><?xml version="1.0" encoding="utf-8"?>
+<p:sld xmlns:a="http://schemas.openxmlformats.org/drawingml/2006/main" xmlns:r="http://schemas.openxmlformats.org/officeDocument/2006/relationships" xmlns:p="http://schemas.openxmlformats.org/presentationml/2006/main" showMasterSp="1" showMasterPhAnim="1">
+  <p:cSld>
+    <p:spTree>
+      <p:nvGrpSpPr>
+        <p:cNvPr id="1" name=""/>
+        <p:cNvGrpSpPr/>
+        <p:nvPr/>
+      </p:nvGrpSpPr>
+      <p:grpSpPr>
+        <a:xfrm>
+          <a:off x="0" y="0"/>
+          <a:ext cx="0" cy="0"/>
+          <a:chOff x="0" y="0"/>
+          <a:chExt cx="0" cy="0"/>
+        </a:xfrm>
+      </p:grpSpPr>
+      <p:sp>
+        <p:nvSpPr>
+          <p:cNvPr id="146" name="Shape 146"/>
+          <p:cNvSpPr/>
+          <p:nvPr>
+            <p:ph type="body" idx="1"/>
+          </p:nvPr>
+        </p:nvSpPr>
+        <p:spPr>
+          <a:prstGeom prst="rect">
+            <a:avLst/>
+          </a:prstGeom>
+        </p:spPr>
+        <p:txBody>
+          <a:bodyPr/>
+          <a:lstStyle/>
+          <a:p>
+            <a:pPr/>
+          </a:p>
+        </p:txBody>
+      </p:sp>
+      <p:sp>
+        <p:nvSpPr>
+          <p:cNvPr id="147" name="Shape 147"/>
+          <p:cNvSpPr/>
+          <p:nvPr>
+            <p:ph type="title"/>
+          </p:nvPr>
+        </p:nvSpPr>
+        <p:spPr>
+          <a:prstGeom prst="rect">
+            <a:avLst/>
+          </a:prstGeom>
+        </p:spPr>
+        <p:txBody>
+          <a:bodyPr/>
+          <a:lstStyle/>
+          <a:p>
+            <a:pPr/>
+            <a:r>
+              <a:t>Libraries and resources to be mentioned</a:t>
+            </a:r>
+          </a:p>
+        </p:txBody>
+      </p:sp>
+      <p:sp>
+        <p:nvSpPr>
+          <p:cNvPr id="148" name="Shape 148"/>
+          <p:cNvSpPr/>
+          <p:nvPr>
+            <p:ph type="sldNum" sz="quarter" idx="4294967295"/>
+          </p:nvPr>
+        </p:nvSpPr>
+        <p:spPr>
+          <a:prstGeom prst="rect">
+            <a:avLst/>
+          </a:prstGeom>
+          <a:extLst>
+            <a:ext uri="{C572A759-6A51-4108-AA02-DFA0A04FC94B}">
+              <ma14:wrappingTextBoxFlag xmlns:ma14="http://schemas.microsoft.com/office/mac/drawingml/2011/main" val="1"/>
+            </a:ext>
+          </a:extLst>
+        </p:spPr>
+        <p:txBody>
+          <a:bodyPr/>
+          <a:lstStyle/>
+          <a:p>
+            <a:pPr/>
+            <a:fld id="{86CB4B4D-7CA3-9044-876B-883B54F8677D}" type="slidenum"/>
+          </a:p>
+        </p:txBody>
+      </p:sp>
+    </p:spTree>
+  </p:cSld>
+  <p:clrMapOvr>
+    <a:masterClrMapping/>
+  </p:clrMapOvr>
+  <p:transition xmlns:p14="http://schemas.microsoft.com/office/powerpoint/2010/main" spd="med" advClick="1" p14:dur="1000"/>
+</p:sld>
+</file>
+
+<file path=ppt/slides/slide18.xml><?xml version="1.0" encoding="utf-8"?>
+<p:sld xmlns:a="http://schemas.openxmlformats.org/drawingml/2006/main" xmlns:r="http://schemas.openxmlformats.org/officeDocument/2006/relationships" xmlns:p="http://schemas.openxmlformats.org/presentationml/2006/main" showMasterSp="1" showMasterPhAnim="1">
+  <p:cSld>
+    <p:spTree>
+      <p:nvGrpSpPr>
+        <p:cNvPr id="1" name=""/>
+        <p:cNvGrpSpPr/>
+        <p:nvPr/>
+      </p:nvGrpSpPr>
+      <p:grpSpPr>
+        <a:xfrm>
+          <a:off x="0" y="0"/>
+          <a:ext cx="0" cy="0"/>
+          <a:chOff x="0" y="0"/>
+          <a:chExt cx="0" cy="0"/>
+        </a:xfrm>
+      </p:grpSpPr>
+      <p:sp>
+        <p:nvSpPr>
+          <p:cNvPr id="150" name="Shape 150"/>
+          <p:cNvSpPr/>
+          <p:nvPr>
+            <p:ph type="body" idx="1"/>
+          </p:nvPr>
+        </p:nvSpPr>
+        <p:spPr>
+          <a:prstGeom prst="rect">
+            <a:avLst/>
+          </a:prstGeom>
+        </p:spPr>
+        <p:txBody>
+          <a:bodyPr/>
+          <a:lstStyle/>
+          <a:p>
+            <a:pPr/>
+          </a:p>
+        </p:txBody>
+      </p:sp>
+      <p:sp>
+        <p:nvSpPr>
+          <p:cNvPr id="151" name="Shape 151"/>
           <p:cNvSpPr/>
           <p:nvPr>
             <p:ph type="title"/>
@@ -3713,6 +4174,15 @@
           <a:lstStyle/>
           <a:p>
             <a:pPr/>
+            <a:r>
+              <a:t>Path tracing does not produce significant caustics in a reasonable amount of time</a:t>
+            </a:r>
+          </a:p>
+          <a:p>
+            <a:pPr/>
+            <a:r>
+              <a:t>Small probability that a ray starting from camera, hits a surface that actually reflects incoming rays directly through a transparent object to the light source</a:t>
+            </a:r>
           </a:p>
         </p:txBody>
       </p:sp>
@@ -3735,39 +4205,8 @@
           <a:p>
             <a:pPr/>
             <a:r>
-              <a:t>What is a photon mapper?</a:t>
-            </a:r>
-          </a:p>
-        </p:txBody>
-      </p:sp>
-      <p:sp>
-        <p:nvSpPr>
-          <p:cNvPr id="75" name="Shape 75"/>
-          <p:cNvSpPr/>
-          <p:nvPr>
-            <p:ph type="sldNum" sz="quarter" idx="4294967295"/>
-          </p:nvPr>
-        </p:nvSpPr>
-        <p:spPr>
-          <a:xfrm>
-            <a:off x="8502739" y="6568201"/>
-            <a:ext cx="184062" cy="269241"/>
-          </a:xfrm>
-          <a:prstGeom prst="rect">
-            <a:avLst/>
-          </a:prstGeom>
-          <a:extLst>
-            <a:ext uri="{C572A759-6A51-4108-AA02-DFA0A04FC94B}">
-              <ma14:wrappingTextBoxFlag xmlns:ma14="http://schemas.microsoft.com/office/mac/drawingml/2011/main" val="1"/>
-            </a:ext>
-          </a:extLst>
-        </p:spPr>
-        <p:txBody>
-          <a:bodyPr/>
-          <a:lstStyle/>
-          <a:p>
-            <a:pPr/>
-            <a:fld id="{86CB4B4D-7CA3-9044-876B-883B54F8677D}" type="slidenum"/>
+              <a:t>Problem description</a:t>
+            </a:r>
           </a:p>
         </p:txBody>
       </p:sp>
@@ -3799,17 +4238,13 @@
       </p:grpSpPr>
       <p:sp>
         <p:nvSpPr>
-          <p:cNvPr id="77" name="Shape 77"/>
+          <p:cNvPr id="76" name="Shape 76"/>
           <p:cNvSpPr/>
           <p:nvPr>
             <p:ph type="body" idx="1"/>
           </p:nvPr>
         </p:nvSpPr>
         <p:spPr>
-          <a:xfrm>
-            <a:off x="457200" y="1600200"/>
-            <a:ext cx="8229600" cy="4525963"/>
-          </a:xfrm>
           <a:prstGeom prst="rect">
             <a:avLst/>
           </a:prstGeom>
@@ -3819,12 +4254,27 @@
           <a:lstStyle/>
           <a:p>
             <a:pPr/>
-          </a:p>
-        </p:txBody>
-      </p:sp>
-      <p:sp>
-        <p:nvSpPr>
-          <p:cNvPr id="78" name="Shape 78"/>
+            <a:r>
+              <a:t>Collect additional information about light photons being emitted from the light source</a:t>
+            </a:r>
+          </a:p>
+          <a:p>
+            <a:pPr/>
+            <a:r>
+              <a:t>Photons carry energy which can be transmitted whenever an object is hit</a:t>
+            </a:r>
+          </a:p>
+          <a:p>
+            <a:pPr/>
+            <a:r>
+              <a:t>The process of storing photon→object interactions is called photon mapping</a:t>
+            </a:r>
+          </a:p>
+        </p:txBody>
+      </p:sp>
+      <p:sp>
+        <p:nvSpPr>
+          <p:cNvPr id="77" name="Shape 77"/>
           <p:cNvSpPr/>
           <p:nvPr>
             <p:ph type="title"/>
@@ -3841,39 +4291,8 @@
           <a:p>
             <a:pPr/>
             <a:r>
-              <a:t>How does photon mapping work?</a:t>
-            </a:r>
-          </a:p>
-        </p:txBody>
-      </p:sp>
-      <p:sp>
-        <p:nvSpPr>
-          <p:cNvPr id="79" name="Shape 79"/>
-          <p:cNvSpPr/>
-          <p:nvPr>
-            <p:ph type="sldNum" sz="quarter" idx="4294967295"/>
-          </p:nvPr>
-        </p:nvSpPr>
-        <p:spPr>
-          <a:xfrm>
-            <a:off x="8502739" y="6568201"/>
-            <a:ext cx="184062" cy="269241"/>
-          </a:xfrm>
-          <a:prstGeom prst="rect">
-            <a:avLst/>
-          </a:prstGeom>
-          <a:extLst>
-            <a:ext uri="{C572A759-6A51-4108-AA02-DFA0A04FC94B}">
-              <ma14:wrappingTextBoxFlag xmlns:ma14="http://schemas.microsoft.com/office/mac/drawingml/2011/main" val="1"/>
-            </a:ext>
-          </a:extLst>
-        </p:spPr>
-        <p:txBody>
-          <a:bodyPr/>
-          <a:lstStyle/>
-          <a:p>
-            <a:pPr/>
-            <a:fld id="{86CB4B4D-7CA3-9044-876B-883B54F8677D}" type="slidenum"/>
+              <a:t>Solution</a:t>
+            </a:r>
           </a:p>
         </p:txBody>
       </p:sp>
@@ -3905,13 +4324,17 @@
       </p:grpSpPr>
       <p:sp>
         <p:nvSpPr>
-          <p:cNvPr id="81" name="Shape 81"/>
+          <p:cNvPr id="79" name="Shape 79"/>
           <p:cNvSpPr/>
           <p:nvPr>
             <p:ph type="body" idx="1"/>
           </p:nvPr>
         </p:nvSpPr>
         <p:spPr>
+          <a:xfrm>
+            <a:off x="457200" y="1600200"/>
+            <a:ext cx="8229600" cy="4525963"/>
+          </a:xfrm>
           <a:prstGeom prst="rect">
             <a:avLst/>
           </a:prstGeom>
@@ -3921,12 +4344,31 @@
           <a:lstStyle/>
           <a:p>
             <a:pPr/>
-          </a:p>
-        </p:txBody>
-      </p:sp>
-      <p:sp>
-        <p:nvSpPr>
-          <p:cNvPr id="82" name="Shape 82"/>
+            <a:r>
+              <a:t>Basically there are 2 steps involved:</a:t>
+            </a:r>
+          </a:p>
+          <a:p>
+            <a:pPr lvl="1" marL="800100" indent="-342900">
+              <a:buChar char="▪"/>
+            </a:pPr>
+            <a:r>
+              <a:t>Construction of the photon map</a:t>
+            </a:r>
+          </a:p>
+          <a:p>
+            <a:pPr lvl="1" marL="800100" indent="-342900">
+              <a:buChar char="▪"/>
+            </a:pPr>
+            <a:r>
+              <a:t>Rendering</a:t>
+            </a:r>
+          </a:p>
+        </p:txBody>
+      </p:sp>
+      <p:sp>
+        <p:nvSpPr>
+          <p:cNvPr id="80" name="Shape 80"/>
           <p:cNvSpPr/>
           <p:nvPr>
             <p:ph type="title"/>
@@ -3943,14 +4385,14 @@
           <a:p>
             <a:pPr/>
             <a:r>
-              <a:t>Difference between previous renderers?</a:t>
-            </a:r>
-          </a:p>
-        </p:txBody>
-      </p:sp>
-      <p:sp>
-        <p:nvSpPr>
-          <p:cNvPr id="83" name="Shape 83"/>
+              <a:t>How does photon mapping work?</a:t>
+            </a:r>
+          </a:p>
+        </p:txBody>
+      </p:sp>
+      <p:sp>
+        <p:nvSpPr>
+          <p:cNvPr id="81" name="Shape 81"/>
           <p:cNvSpPr/>
           <p:nvPr>
             <p:ph type="sldNum" sz="quarter" idx="4294967295"/>
@@ -3959,7 +4401,7 @@
         <p:spPr>
           <a:xfrm>
             <a:off x="8502739" y="6568201"/>
-            <a:ext cx="184062" cy="269241"/>
+            <a:ext cx="184061" cy="269241"/>
           </a:xfrm>
           <a:prstGeom prst="rect">
             <a:avLst/>
@@ -4007,13 +4449,17 @@
       </p:grpSpPr>
       <p:sp>
         <p:nvSpPr>
-          <p:cNvPr id="85" name="Shape 85"/>
+          <p:cNvPr id="83" name="Shape 83"/>
           <p:cNvSpPr/>
           <p:nvPr>
             <p:ph type="body" idx="1"/>
           </p:nvPr>
         </p:nvSpPr>
         <p:spPr>
+          <a:xfrm>
+            <a:off x="457200" y="1600200"/>
+            <a:ext cx="8229600" cy="4525963"/>
+          </a:xfrm>
           <a:prstGeom prst="rect">
             <a:avLst/>
           </a:prstGeom>
@@ -4023,12 +4469,33 @@
           <a:lstStyle/>
           <a:p>
             <a:pPr/>
-          </a:p>
-        </p:txBody>
-      </p:sp>
-      <p:sp>
-        <p:nvSpPr>
-          <p:cNvPr id="86" name="Shape 86"/>
+            <a:r>
+              <a:t>Shooting photons from light in all directions</a:t>
+            </a:r>
+          </a:p>
+          <a:p>
+            <a:pPr/>
+            <a:r>
+              <a:t>Whenever a photon intersects with a surface, save intersection point and incoming direction in photon map</a:t>
+            </a:r>
+          </a:p>
+          <a:p>
+            <a:pPr/>
+            <a:r>
+              <a:t>Decide if photon gets reflected, transmitted or absorbed by chance</a:t>
+            </a:r>
+          </a:p>
+          <a:p>
+            <a:pPr/>
+            <a:r>
+              <a:t>The photon will not be traced any further once it has been absorbed</a:t>
+            </a:r>
+          </a:p>
+        </p:txBody>
+      </p:sp>
+      <p:sp>
+        <p:nvSpPr>
+          <p:cNvPr id="84" name="Shape 84"/>
           <p:cNvSpPr/>
           <p:nvPr>
             <p:ph type="title"/>
@@ -4045,14 +4512,14 @@
           <a:p>
             <a:pPr/>
             <a:r>
-              <a:t>Implementation details</a:t>
-            </a:r>
-          </a:p>
-        </p:txBody>
-      </p:sp>
-      <p:sp>
-        <p:nvSpPr>
-          <p:cNvPr id="87" name="Shape 87"/>
+              <a:t>Construction of the photon map</a:t>
+            </a:r>
+          </a:p>
+        </p:txBody>
+      </p:sp>
+      <p:sp>
+        <p:nvSpPr>
+          <p:cNvPr id="85" name="Shape 85"/>
           <p:cNvSpPr/>
           <p:nvPr>
             <p:ph type="sldNum" sz="quarter" idx="4294967295"/>
@@ -4061,7 +4528,7 @@
         <p:spPr>
           <a:xfrm>
             <a:off x="8502739" y="6568201"/>
-            <a:ext cx="184062" cy="269241"/>
+            <a:ext cx="184061" cy="269241"/>
           </a:xfrm>
           <a:prstGeom prst="rect">
             <a:avLst/>
@@ -4109,7 +4576,47 @@
       </p:grpSpPr>
       <p:sp>
         <p:nvSpPr>
-          <p:cNvPr id="89" name="Shape 89"/>
+          <p:cNvPr id="87" name="Shape 87"/>
+          <p:cNvSpPr/>
+          <p:nvPr>
+            <p:ph type="body" idx="1"/>
+          </p:nvPr>
+        </p:nvSpPr>
+        <p:spPr>
+          <a:xfrm>
+            <a:off x="457200" y="1600200"/>
+            <a:ext cx="8229600" cy="4525963"/>
+          </a:xfrm>
+          <a:prstGeom prst="rect">
+            <a:avLst/>
+          </a:prstGeom>
+        </p:spPr>
+        <p:txBody>
+          <a:bodyPr/>
+          <a:lstStyle/>
+          <a:p>
+            <a:pPr/>
+            <a:r>
+              <a:t>Conventional photon mappers use ray tracing to determine direct illumination and extend it by adding indirect illumination on top</a:t>
+            </a:r>
+          </a:p>
+          <a:p>
+            <a:pPr/>
+            <a:r>
+              <a:t>At each intersection point that results from a ray hitting a surface during ray tracing, the nearest N photons will be determined</a:t>
+            </a:r>
+          </a:p>
+          <a:p>
+            <a:pPr/>
+            <a:r>
+              <a:t>Summing up the direct and indirect portions of illumination at all intersection points results in a globally illuminated scene</a:t>
+            </a:r>
+          </a:p>
+        </p:txBody>
+      </p:sp>
+      <p:sp>
+        <p:nvSpPr>
+          <p:cNvPr id="88" name="Shape 88"/>
           <p:cNvSpPr/>
           <p:nvPr>
             <p:ph type="title"/>
@@ -4126,14 +4633,14 @@
           <a:p>
             <a:pPr/>
             <a:r>
-              <a:t>KD-Tree</a:t>
-            </a:r>
-          </a:p>
-        </p:txBody>
-      </p:sp>
-      <p:sp>
-        <p:nvSpPr>
-          <p:cNvPr id="90" name="Shape 90"/>
+              <a:t>Rendering</a:t>
+            </a:r>
+          </a:p>
+        </p:txBody>
+      </p:sp>
+      <p:sp>
+        <p:nvSpPr>
+          <p:cNvPr id="89" name="Shape 89"/>
           <p:cNvSpPr/>
           <p:nvPr>
             <p:ph type="sldNum" sz="quarter" idx="4294967295"/>
@@ -4142,7 +4649,7 @@
         <p:spPr>
           <a:xfrm>
             <a:off x="8502739" y="6568201"/>
-            <a:ext cx="184062" cy="269241"/>
+            <a:ext cx="184061" cy="269241"/>
           </a:xfrm>
           <a:prstGeom prst="rect">
             <a:avLst/>
@@ -4159,69 +4666,6 @@
           <a:p>
             <a:pPr/>
             <a:fld id="{86CB4B4D-7CA3-9044-876B-883B54F8677D}" type="slidenum"/>
-          </a:p>
-        </p:txBody>
-      </p:sp>
-      <p:pic>
-        <p:nvPicPr>
-          <p:cNvPr id="91" name="kd-table-0.png"/>
-          <p:cNvPicPr>
-            <a:picLocks noChangeAspect="1"/>
-          </p:cNvPicPr>
-          <p:nvPr/>
-        </p:nvPicPr>
-        <p:blipFill>
-          <a:blip r:embed="rId2">
-            <a:extLst/>
-          </a:blip>
-          <a:stretch>
-            <a:fillRect/>
-          </a:stretch>
-        </p:blipFill>
-        <p:spPr>
-          <a:xfrm>
-            <a:off x="4694521" y="1206500"/>
-            <a:ext cx="4445001" cy="4445001"/>
-          </a:xfrm>
-          <a:prstGeom prst="rect">
-            <a:avLst/>
-          </a:prstGeom>
-          <a:ln w="12700">
-            <a:miter lim="400000"/>
-          </a:ln>
-        </p:spPr>
-      </p:pic>
-      <p:sp>
-        <p:nvSpPr>
-          <p:cNvPr id="92" name="Shape 92"/>
-          <p:cNvSpPr/>
-          <p:nvPr>
-            <p:ph type="body" idx="1"/>
-          </p:nvPr>
-        </p:nvSpPr>
-        <p:spPr>
-          <a:prstGeom prst="rect">
-            <a:avLst/>
-          </a:prstGeom>
-        </p:spPr>
-        <p:txBody>
-          <a:bodyPr/>
-          <a:lstStyle/>
-          <a:p>
-            <a:pPr marL="0" indent="0">
-              <a:buClrTx/>
-              <a:buSzTx/>
-              <a:buFontTx/>
-              <a:buNone/>
-              <a:defRPr sz="2500"/>
-            </a:pPr>
-            <a:r>
-              <a:t>Inserting 2D (x,y) coordinates:</a:t>
-            </a:r>
-            <a:br/>
-            <a:r>
-              <a:t>(7,2) (5,4) (2,3) (9,6) (4,7) (8,1)</a:t>
-            </a:r>
           </a:p>
         </p:txBody>
       </p:sp>
@@ -4253,7 +4697,28 @@
       </p:grpSpPr>
       <p:sp>
         <p:nvSpPr>
-          <p:cNvPr id="94" name="Shape 94"/>
+          <p:cNvPr id="91" name="Shape 91"/>
+          <p:cNvSpPr/>
+          <p:nvPr>
+            <p:ph type="body" idx="1"/>
+          </p:nvPr>
+        </p:nvSpPr>
+        <p:spPr>
+          <a:prstGeom prst="rect">
+            <a:avLst/>
+          </a:prstGeom>
+        </p:spPr>
+        <p:txBody>
+          <a:bodyPr/>
+          <a:lstStyle/>
+          <a:p>
+            <a:pPr/>
+          </a:p>
+        </p:txBody>
+      </p:sp>
+      <p:sp>
+        <p:nvSpPr>
+          <p:cNvPr id="92" name="Shape 92"/>
           <p:cNvSpPr/>
           <p:nvPr>
             <p:ph type="title"/>
@@ -4270,14 +4735,14 @@
           <a:p>
             <a:pPr/>
             <a:r>
-              <a:t>KD-Tree</a:t>
-            </a:r>
-          </a:p>
-        </p:txBody>
-      </p:sp>
-      <p:sp>
-        <p:nvSpPr>
-          <p:cNvPr id="95" name="Shape 95"/>
+              <a:t>Implementation details</a:t>
+            </a:r>
+          </a:p>
+        </p:txBody>
+      </p:sp>
+      <p:sp>
+        <p:nvSpPr>
+          <p:cNvPr id="93" name="Shape 93"/>
           <p:cNvSpPr/>
           <p:nvPr>
             <p:ph type="sldNum" sz="quarter" idx="4294967295"/>
@@ -4303,106 +4768,6 @@
           <a:p>
             <a:pPr/>
             <a:fld id="{86CB4B4D-7CA3-9044-876B-883B54F8677D}" type="slidenum"/>
-          </a:p>
-        </p:txBody>
-      </p:sp>
-      <p:pic>
-        <p:nvPicPr>
-          <p:cNvPr id="96" name="kd-table-1.png"/>
-          <p:cNvPicPr>
-            <a:picLocks noChangeAspect="1"/>
-          </p:cNvPicPr>
-          <p:nvPr/>
-        </p:nvPicPr>
-        <p:blipFill>
-          <a:blip r:embed="rId2">
-            <a:extLst/>
-          </a:blip>
-          <a:stretch>
-            <a:fillRect/>
-          </a:stretch>
-        </p:blipFill>
-        <p:spPr>
-          <a:xfrm>
-            <a:off x="4694521" y="1206500"/>
-            <a:ext cx="4445001" cy="4445000"/>
-          </a:xfrm>
-          <a:prstGeom prst="rect">
-            <a:avLst/>
-          </a:prstGeom>
-          <a:ln w="12700">
-            <a:miter lim="400000"/>
-          </a:ln>
-        </p:spPr>
-      </p:pic>
-      <p:pic>
-        <p:nvPicPr>
-          <p:cNvPr id="97" name="kd-tree-1.png"/>
-          <p:cNvPicPr>
-            <a:picLocks noChangeAspect="1"/>
-          </p:cNvPicPr>
-          <p:nvPr/>
-        </p:nvPicPr>
-        <p:blipFill>
-          <a:blip r:embed="rId3">
-            <a:extLst/>
-          </a:blip>
-          <a:stretch>
-            <a:fillRect/>
-          </a:stretch>
-        </p:blipFill>
-        <p:spPr>
-          <a:xfrm>
-            <a:off x="4189" y="3060064"/>
-            <a:ext cx="4445001" cy="737871"/>
-          </a:xfrm>
-          <a:prstGeom prst="rect">
-            <a:avLst/>
-          </a:prstGeom>
-          <a:ln w="12700">
-            <a:miter lim="400000"/>
-          </a:ln>
-        </p:spPr>
-      </p:pic>
-      <p:sp>
-        <p:nvSpPr>
-          <p:cNvPr id="98" name="Shape 98"/>
-          <p:cNvSpPr/>
-          <p:nvPr>
-            <p:ph type="body" idx="1"/>
-          </p:nvPr>
-        </p:nvSpPr>
-        <p:spPr>
-          <a:prstGeom prst="rect">
-            <a:avLst/>
-          </a:prstGeom>
-        </p:spPr>
-        <p:txBody>
-          <a:bodyPr/>
-          <a:lstStyle/>
-          <a:p>
-            <a:pPr marL="0" indent="0">
-              <a:buClrTx/>
-              <a:buSzTx/>
-              <a:buFontTx/>
-              <a:buNone/>
-              <a:defRPr sz="2500"/>
-            </a:pPr>
-            <a:r>
-              <a:t>Inserting 2D (x,y) coordinates:</a:t>
-            </a:r>
-            <a:br/>
-            <a:r>
-              <a:rPr>
-                <a:solidFill>
-                  <a:srgbClr val="942192"/>
-                </a:solidFill>
-              </a:rPr>
-              <a:t>(7,2)</a:t>
-            </a:r>
-            <a:r>
-              <a:t> (5,4) (2,3) (9,6) (4,7) (8,1)</a:t>
-            </a:r>
           </a:p>
         </p:txBody>
       </p:sp>
@@ -4434,7 +4799,7 @@
       </p:grpSpPr>
       <p:sp>
         <p:nvSpPr>
-          <p:cNvPr id="100" name="Shape 100"/>
+          <p:cNvPr id="95" name="Shape 95"/>
           <p:cNvSpPr/>
           <p:nvPr>
             <p:ph type="title"/>
@@ -4458,7 +4823,7 @@
       </p:sp>
       <p:sp>
         <p:nvSpPr>
-          <p:cNvPr id="101" name="Shape 101"/>
+          <p:cNvPr id="96" name="Shape 96"/>
           <p:cNvSpPr/>
           <p:nvPr>
             <p:ph type="sldNum" sz="quarter" idx="4294967295"/>
@@ -4489,7 +4854,7 @@
       </p:sp>
       <p:pic>
         <p:nvPicPr>
-          <p:cNvPr id="102" name="kd-table-2.png"/>
+          <p:cNvPr id="97" name="kd-table-0.png"/>
           <p:cNvPicPr>
             <a:picLocks noChangeAspect="1"/>
           </p:cNvPicPr>
@@ -4516,38 +4881,9 @@
           </a:ln>
         </p:spPr>
       </p:pic>
-      <p:pic>
-        <p:nvPicPr>
-          <p:cNvPr id="103" name="kd-tree-2.png"/>
-          <p:cNvPicPr>
-            <a:picLocks noChangeAspect="1"/>
-          </p:cNvPicPr>
-          <p:nvPr/>
-        </p:nvPicPr>
-        <p:blipFill>
-          <a:blip r:embed="rId3">
-            <a:extLst/>
-          </a:blip>
-          <a:stretch>
-            <a:fillRect/>
-          </a:stretch>
-        </p:blipFill>
-        <p:spPr>
-          <a:xfrm>
-            <a:off x="5989" y="2691129"/>
-            <a:ext cx="4445001" cy="1475741"/>
-          </a:xfrm>
-          <a:prstGeom prst="rect">
-            <a:avLst/>
-          </a:prstGeom>
-          <a:ln w="12700">
-            <a:miter lim="400000"/>
-          </a:ln>
-        </p:spPr>
-      </p:pic>
-      <p:sp>
-        <p:nvSpPr>
-          <p:cNvPr id="104" name="Shape 104"/>
+      <p:sp>
+        <p:nvSpPr>
+          <p:cNvPr id="98" name="Shape 98"/>
           <p:cNvSpPr/>
           <p:nvPr>
             <p:ph type="body" idx="1"/>
@@ -4574,18 +4910,7 @@
             </a:r>
             <a:br/>
             <a:r>
-              <a:t>(7,2) </a:t>
-            </a:r>
-            <a:r>
-              <a:rPr>
-                <a:solidFill>
-                  <a:srgbClr val="942192"/>
-                </a:solidFill>
-              </a:rPr>
-              <a:t>(5,4)</a:t>
-            </a:r>
-            <a:r>
-              <a:t> (2,3) (9,6) (4,7) (8,1)</a:t>
+              <a:t>(7,2) (5,4) (2,3) (9,6) (4,7) (8,1)</a:t>
             </a:r>
           </a:p>
         </p:txBody>
@@ -4618,7 +4943,7 @@
       </p:grpSpPr>
       <p:sp>
         <p:nvSpPr>
-          <p:cNvPr id="106" name="Shape 106"/>
+          <p:cNvPr id="100" name="Shape 100"/>
           <p:cNvSpPr/>
           <p:nvPr>
             <p:ph type="title"/>
@@ -4642,7 +4967,7 @@
       </p:sp>
       <p:sp>
         <p:nvSpPr>
-          <p:cNvPr id="107" name="Shape 107"/>
+          <p:cNvPr id="101" name="Shape 101"/>
           <p:cNvSpPr/>
           <p:nvPr>
             <p:ph type="sldNum" sz="quarter" idx="4294967295"/>
@@ -4673,7 +4998,7 @@
       </p:sp>
       <p:pic>
         <p:nvPicPr>
-          <p:cNvPr id="108" name="kd-table-3.png"/>
+          <p:cNvPr id="102" name="kd-table-1.png"/>
           <p:cNvPicPr>
             <a:picLocks noChangeAspect="1"/>
           </p:cNvPicPr>
@@ -4702,7 +5027,7 @@
       </p:pic>
       <p:pic>
         <p:nvPicPr>
-          <p:cNvPr id="109" name="kd-tree-3.png"/>
+          <p:cNvPr id="103" name="kd-tree-1.png"/>
           <p:cNvPicPr>
             <a:picLocks noChangeAspect="1"/>
           </p:cNvPicPr>
@@ -4718,8 +5043,8 @@
         </p:blipFill>
         <p:spPr>
           <a:xfrm>
-            <a:off x="0" y="2322195"/>
-            <a:ext cx="4445001" cy="2213611"/>
+            <a:off x="4189" y="3060064"/>
+            <a:ext cx="4445001" cy="737871"/>
           </a:xfrm>
           <a:prstGeom prst="rect">
             <a:avLst/>
@@ -4731,7 +5056,7 @@
       </p:pic>
       <p:sp>
         <p:nvSpPr>
-          <p:cNvPr id="110" name="Shape 110"/>
+          <p:cNvPr id="104" name="Shape 104"/>
           <p:cNvSpPr/>
           <p:nvPr>
             <p:ph type="body" idx="1"/>
@@ -4758,18 +5083,15 @@
             </a:r>
             <a:br/>
             <a:r>
-              <a:t>(7,2) (5,4) </a:t>
-            </a:r>
-            <a:r>
               <a:rPr>
                 <a:solidFill>
                   <a:srgbClr val="942192"/>
                 </a:solidFill>
               </a:rPr>
-              <a:t>(2,3)</a:t>
-            </a:r>
-            <a:r>
-              <a:t> (9,6) (4,7) (8,1)</a:t>
+              <a:t>(7,2)</a:t>
+            </a:r>
+            <a:r>
+              <a:t> (5,4) (2,3) (9,6) (4,7) (8,1)</a:t>
             </a:r>
           </a:p>
         </p:txBody>

</xml_diff>

<commit_message>
präsi merge with flo's stuff
</commit_message>
<xml_diff>
--- a/Präsentation/presentation.pptx
+++ b/Präsentation/presentation.pptx
@@ -23,9 +23,6 @@
     <p:sldId id="268" r:id="rId20"/>
     <p:sldId id="269" r:id="rId21"/>
     <p:sldId id="270" r:id="rId22"/>
-    <p:sldId id="271" r:id="rId23"/>
-    <p:sldId id="272" r:id="rId24"/>
-    <p:sldId id="273" r:id="rId25"/>
   </p:sldIdLst>
   <p:sldSz cx="9144000" cy="6858000"/>
   <p:notesSz cx="6858000" cy="9144000"/>
@@ -2681,7 +2678,7 @@
         </p:nvSpPr>
         <p:spPr>
           <a:xfrm>
-            <a:off x="1692275" y="3061597"/>
+            <a:off x="1692275" y="2998097"/>
             <a:ext cx="5759450" cy="1658327"/>
           </a:xfrm>
           <a:prstGeom prst="rect">
@@ -2705,7 +2702,7 @@
               <a:buSzTx/>
               <a:buFontTx/>
               <a:buNone/>
-              <a:defRPr sz="1536"/>
+              <a:defRPr b="1" sz="1727"/>
             </a:pPr>
             <a:r>
               <a:t>Final project presentation</a:t>
@@ -2797,6 +2794,36 @@
           </a:p>
         </p:txBody>
       </p:sp>
+      <p:pic>
+        <p:nvPicPr>
+          <p:cNvPr id="72" name="superhuge.jpg"/>
+          <p:cNvPicPr>
+            <a:picLocks noChangeAspect="1"/>
+          </p:cNvPicPr>
+          <p:nvPr/>
+        </p:nvPicPr>
+        <p:blipFill>
+          <a:blip r:embed="rId2">
+            <a:extLst/>
+          </a:blip>
+          <a:srcRect l="0" t="18182" r="0" b="2089"/>
+          <a:stretch>
+            <a:fillRect/>
+          </a:stretch>
+        </p:blipFill>
+        <p:spPr>
+          <a:xfrm>
+            <a:off x="3392685" y="4780320"/>
+            <a:ext cx="2358633" cy="1880477"/>
+          </a:xfrm>
+          <a:prstGeom prst="rect">
+            <a:avLst/>
+          </a:prstGeom>
+          <a:ln w="12700">
+            <a:miter lim="400000"/>
+          </a:ln>
+        </p:spPr>
+      </p:pic>
     </p:spTree>
   </p:cSld>
   <p:clrMapOvr>
@@ -2825,7 +2852,7 @@
       </p:grpSpPr>
       <p:sp>
         <p:nvSpPr>
-          <p:cNvPr id="108" name="Shape 108"/>
+          <p:cNvPr id="113" name="Shape 113"/>
           <p:cNvSpPr/>
           <p:nvPr>
             <p:ph type="title"/>
@@ -2842,14 +2869,14 @@
           <a:p>
             <a:pPr/>
             <a:r>
-              <a:t>KD-Tree</a:t>
+              <a:t>Kd-tree</a:t>
             </a:r>
           </a:p>
         </p:txBody>
       </p:sp>
       <p:sp>
         <p:nvSpPr>
-          <p:cNvPr id="109" name="Shape 109"/>
+          <p:cNvPr id="114" name="Shape 114"/>
           <p:cNvSpPr/>
           <p:nvPr>
             <p:ph type="sldNum" sz="quarter" idx="4294967295"/>
@@ -2876,7 +2903,7 @@
       </p:sp>
       <p:pic>
         <p:nvPicPr>
-          <p:cNvPr id="110" name="kd-table-2.png"/>
+          <p:cNvPr id="115" name="kd-table-4.png"/>
           <p:cNvPicPr>
             <a:picLocks noChangeAspect="1"/>
           </p:cNvPicPr>
@@ -2905,7 +2932,7 @@
       </p:pic>
       <p:pic>
         <p:nvPicPr>
-          <p:cNvPr id="111" name="kd-tree-2.png"/>
+          <p:cNvPr id="116" name="kd-tree-4.png"/>
           <p:cNvPicPr>
             <a:picLocks noChangeAspect="1"/>
           </p:cNvPicPr>
@@ -2921,8 +2948,8 @@
         </p:blipFill>
         <p:spPr>
           <a:xfrm>
-            <a:off x="5989" y="2691129"/>
-            <a:ext cx="4445001" cy="1475741"/>
+            <a:off x="0" y="2597785"/>
+            <a:ext cx="4445000" cy="1662430"/>
           </a:xfrm>
           <a:prstGeom prst="rect">
             <a:avLst/>
@@ -2934,7 +2961,7 @@
       </p:pic>
       <p:sp>
         <p:nvSpPr>
-          <p:cNvPr id="112" name="Shape 112"/>
+          <p:cNvPr id="117" name="Shape 117"/>
           <p:cNvSpPr/>
           <p:nvPr>
             <p:ph type="body" idx="1"/>
@@ -2961,7 +2988,7 @@
             </a:r>
             <a:br/>
             <a:r>
-              <a:t>(7,2) </a:t>
+              <a:t>(7,2) (5,4) (2,3) </a:t>
             </a:r>
             <a:r>
               <a:rPr>
@@ -2969,10 +2996,10 @@
                   <a:srgbClr val="942192"/>
                 </a:solidFill>
               </a:rPr>
-              <a:t>(5,4)</a:t>
-            </a:r>
-            <a:r>
-              <a:t> (2,3) (9,6) (4,7) (8,1)</a:t>
+              <a:t>(9,6)</a:t>
+            </a:r>
+            <a:r>
+              <a:t> (4,7) (8,1)</a:t>
             </a:r>
           </a:p>
         </p:txBody>
@@ -3005,7 +3032,7 @@
       </p:grpSpPr>
       <p:sp>
         <p:nvSpPr>
-          <p:cNvPr id="114" name="Shape 114"/>
+          <p:cNvPr id="119" name="Shape 119"/>
           <p:cNvSpPr/>
           <p:nvPr>
             <p:ph type="title"/>
@@ -3022,14 +3049,14 @@
           <a:p>
             <a:pPr/>
             <a:r>
-              <a:t>KD-Tree</a:t>
+              <a:t>Kd-tree</a:t>
             </a:r>
           </a:p>
         </p:txBody>
       </p:sp>
       <p:sp>
         <p:nvSpPr>
-          <p:cNvPr id="115" name="Shape 115"/>
+          <p:cNvPr id="120" name="Shape 120"/>
           <p:cNvSpPr/>
           <p:nvPr>
             <p:ph type="sldNum" sz="quarter" idx="4294967295"/>
@@ -3056,7 +3083,7 @@
       </p:sp>
       <p:pic>
         <p:nvPicPr>
-          <p:cNvPr id="116" name="kd-table-3.png"/>
+          <p:cNvPr id="121" name="kd-table-5.png"/>
           <p:cNvPicPr>
             <a:picLocks noChangeAspect="1"/>
           </p:cNvPicPr>
@@ -3085,7 +3112,7 @@
       </p:pic>
       <p:pic>
         <p:nvPicPr>
-          <p:cNvPr id="117" name="kd-tree-3.png"/>
+          <p:cNvPr id="122" name="kd-tree-5.png"/>
           <p:cNvPicPr>
             <a:picLocks noChangeAspect="1"/>
           </p:cNvPicPr>
@@ -3101,8 +3128,8 @@
         </p:blipFill>
         <p:spPr>
           <a:xfrm>
-            <a:off x="0" y="2322195"/>
-            <a:ext cx="4445000" cy="2213611"/>
+            <a:off x="0" y="2597785"/>
+            <a:ext cx="4445000" cy="1662430"/>
           </a:xfrm>
           <a:prstGeom prst="rect">
             <a:avLst/>
@@ -3114,7 +3141,7 @@
       </p:pic>
       <p:sp>
         <p:nvSpPr>
-          <p:cNvPr id="118" name="Shape 118"/>
+          <p:cNvPr id="123" name="Shape 123"/>
           <p:cNvSpPr/>
           <p:nvPr>
             <p:ph type="body" idx="1"/>
@@ -3141,7 +3168,7 @@
             </a:r>
             <a:br/>
             <a:r>
-              <a:t>(7,2) (5,4) </a:t>
+              <a:t>(7,2) (5,4) (2,3) (9,6) </a:t>
             </a:r>
             <a:r>
               <a:rPr>
@@ -3149,10 +3176,10 @@
                   <a:srgbClr val="942192"/>
                 </a:solidFill>
               </a:rPr>
-              <a:t>(2,3)</a:t>
-            </a:r>
-            <a:r>
-              <a:t> (9,6) (4,7) (8,1)</a:t>
+              <a:t>(4,7)</a:t>
+            </a:r>
+            <a:r>
+              <a:t> (8,1)</a:t>
             </a:r>
           </a:p>
         </p:txBody>
@@ -3185,7 +3212,7 @@
       </p:grpSpPr>
       <p:sp>
         <p:nvSpPr>
-          <p:cNvPr id="120" name="Shape 120"/>
+          <p:cNvPr id="125" name="Shape 125"/>
           <p:cNvSpPr/>
           <p:nvPr>
             <p:ph type="title"/>
@@ -3202,14 +3229,14 @@
           <a:p>
             <a:pPr/>
             <a:r>
-              <a:t>KD-Tree</a:t>
+              <a:t>Kd-tree</a:t>
             </a:r>
           </a:p>
         </p:txBody>
       </p:sp>
       <p:sp>
         <p:nvSpPr>
-          <p:cNvPr id="121" name="Shape 121"/>
+          <p:cNvPr id="126" name="Shape 126"/>
           <p:cNvSpPr/>
           <p:nvPr>
             <p:ph type="sldNum" sz="quarter" idx="4294967295"/>
@@ -3236,7 +3263,7 @@
       </p:sp>
       <p:pic>
         <p:nvPicPr>
-          <p:cNvPr id="122" name="kd-table-4.png"/>
+          <p:cNvPr id="127" name="kd-table-6.png"/>
           <p:cNvPicPr>
             <a:picLocks noChangeAspect="1"/>
           </p:cNvPicPr>
@@ -3265,7 +3292,7 @@
       </p:pic>
       <p:pic>
         <p:nvPicPr>
-          <p:cNvPr id="123" name="kd-tree-4.png"/>
+          <p:cNvPr id="128" name="kd-tree-6.png"/>
           <p:cNvPicPr>
             <a:picLocks noChangeAspect="1"/>
           </p:cNvPicPr>
@@ -3294,7 +3321,7 @@
       </p:pic>
       <p:sp>
         <p:nvSpPr>
-          <p:cNvPr id="124" name="Shape 124"/>
+          <p:cNvPr id="129" name="Shape 129"/>
           <p:cNvSpPr/>
           <p:nvPr>
             <p:ph type="body" idx="1"/>
@@ -3321,7 +3348,7 @@
             </a:r>
             <a:br/>
             <a:r>
-              <a:t>(7,2) (5,4) (2,3) </a:t>
+              <a:t>(7,2) (5,4) (2,3) (9,6) (4,7) </a:t>
             </a:r>
             <a:r>
               <a:rPr>
@@ -3329,10 +3356,7 @@
                   <a:srgbClr val="942192"/>
                 </a:solidFill>
               </a:rPr>
-              <a:t>(9,6)</a:t>
-            </a:r>
-            <a:r>
-              <a:t> (4,7) (8,1)</a:t>
+              <a:t>(8,1)</a:t>
             </a:r>
           </a:p>
         </p:txBody>
@@ -3365,7 +3389,7 @@
       </p:grpSpPr>
       <p:sp>
         <p:nvSpPr>
-          <p:cNvPr id="126" name="Shape 126"/>
+          <p:cNvPr id="131" name="Shape 131"/>
           <p:cNvSpPr/>
           <p:nvPr>
             <p:ph type="title"/>
@@ -3382,14 +3406,14 @@
           <a:p>
             <a:pPr/>
             <a:r>
-              <a:t>KD-Tree</a:t>
+              <a:t>Kd-tree</a:t>
             </a:r>
           </a:p>
         </p:txBody>
       </p:sp>
       <p:sp>
         <p:nvSpPr>
-          <p:cNvPr id="127" name="Shape 127"/>
+          <p:cNvPr id="132" name="Shape 132"/>
           <p:cNvSpPr/>
           <p:nvPr>
             <p:ph type="sldNum" sz="quarter" idx="4294967295"/>
@@ -3416,7 +3440,7 @@
       </p:sp>
       <p:pic>
         <p:nvPicPr>
-          <p:cNvPr id="128" name="kd-table-5.png"/>
+          <p:cNvPr id="133" name="kd-table-6.png"/>
           <p:cNvPicPr>
             <a:picLocks noChangeAspect="1"/>
           </p:cNvPicPr>
@@ -3445,7 +3469,7 @@
       </p:pic>
       <p:pic>
         <p:nvPicPr>
-          <p:cNvPr id="129" name="kd-tree-5.png"/>
+          <p:cNvPr id="134" name="kd-tree-6.png"/>
           <p:cNvPicPr>
             <a:picLocks noChangeAspect="1"/>
           </p:cNvPicPr>
@@ -3474,7 +3498,7 @@
       </p:pic>
       <p:sp>
         <p:nvSpPr>
-          <p:cNvPr id="130" name="Shape 130"/>
+          <p:cNvPr id="135" name="Shape 135"/>
           <p:cNvSpPr/>
           <p:nvPr>
             <p:ph type="body" idx="1"/>
@@ -3501,18 +3525,7 @@
             </a:r>
             <a:br/>
             <a:r>
-              <a:t>(7,2) (5,4) (2,3) (9,6) </a:t>
-            </a:r>
-            <a:r>
-              <a:rPr>
-                <a:solidFill>
-                  <a:srgbClr val="942192"/>
-                </a:solidFill>
-              </a:rPr>
-              <a:t>(4,7)</a:t>
-            </a:r>
-            <a:r>
-              <a:t> (8,1)</a:t>
+              <a:t>(7,2) (5,4) (2,3) (9,6) (4,7) (8,1)</a:t>
             </a:r>
           </a:p>
         </p:txBody>
@@ -3545,7 +3558,65 @@
       </p:grpSpPr>
       <p:sp>
         <p:nvSpPr>
-          <p:cNvPr id="132" name="Shape 132"/>
+          <p:cNvPr id="137" name="Shape 137"/>
+          <p:cNvSpPr/>
+          <p:nvPr>
+            <p:ph type="body" idx="1"/>
+          </p:nvPr>
+        </p:nvSpPr>
+        <p:spPr>
+          <a:prstGeom prst="rect">
+            <a:avLst/>
+          </a:prstGeom>
+        </p:spPr>
+        <p:txBody>
+          <a:bodyPr/>
+          <a:lstStyle/>
+          <a:p>
+            <a:pPr>
+              <a:lnSpc>
+                <a:spcPct val="200000"/>
+              </a:lnSpc>
+            </a:pPr>
+            <a:r>
+              <a:t>GLM</a:t>
+            </a:r>
+          </a:p>
+          <a:p>
+            <a:pPr>
+              <a:lnSpc>
+                <a:spcPct val="200000"/>
+              </a:lnSpc>
+            </a:pPr>
+            <a:r>
+              <a:t>OpenGL</a:t>
+            </a:r>
+          </a:p>
+          <a:p>
+            <a:pPr>
+              <a:lnSpc>
+                <a:spcPct val="200000"/>
+              </a:lnSpc>
+            </a:pPr>
+            <a:r>
+              <a:t>Glut</a:t>
+            </a:r>
+          </a:p>
+          <a:p>
+            <a:pPr>
+              <a:lnSpc>
+                <a:spcPct val="200000"/>
+              </a:lnSpc>
+            </a:pPr>
+            <a:r>
+              <a:t>NanoFlann (Kd-tree)</a:t>
+            </a:r>
+          </a:p>
+        </p:txBody>
+      </p:sp>
+      <p:sp>
+        <p:nvSpPr>
+          <p:cNvPr id="138" name="Shape 138"/>
           <p:cNvSpPr/>
           <p:nvPr>
             <p:ph type="title"/>
@@ -3562,14 +3633,14 @@
           <a:p>
             <a:pPr/>
             <a:r>
-              <a:t>KD-Tree</a:t>
+              <a:t>Libraries and resources to be mentioned</a:t>
             </a:r>
           </a:p>
         </p:txBody>
       </p:sp>
       <p:sp>
         <p:nvSpPr>
-          <p:cNvPr id="133" name="Shape 133"/>
+          <p:cNvPr id="139" name="Shape 139"/>
           <p:cNvSpPr/>
           <p:nvPr>
             <p:ph type="sldNum" sz="quarter" idx="4294967295"/>
@@ -3591,106 +3662,6 @@
           <a:p>
             <a:pPr/>
             <a:fld id="{86CB4B4D-7CA3-9044-876B-883B54F8677D}" type="slidenum"/>
-          </a:p>
-        </p:txBody>
-      </p:sp>
-      <p:pic>
-        <p:nvPicPr>
-          <p:cNvPr id="134" name="kd-table-6.png"/>
-          <p:cNvPicPr>
-            <a:picLocks noChangeAspect="1"/>
-          </p:cNvPicPr>
-          <p:nvPr/>
-        </p:nvPicPr>
-        <p:blipFill>
-          <a:blip r:embed="rId2">
-            <a:extLst/>
-          </a:blip>
-          <a:stretch>
-            <a:fillRect/>
-          </a:stretch>
-        </p:blipFill>
-        <p:spPr>
-          <a:xfrm>
-            <a:off x="4694521" y="1206500"/>
-            <a:ext cx="4445001" cy="4445000"/>
-          </a:xfrm>
-          <a:prstGeom prst="rect">
-            <a:avLst/>
-          </a:prstGeom>
-          <a:ln w="12700">
-            <a:miter lim="400000"/>
-          </a:ln>
-        </p:spPr>
-      </p:pic>
-      <p:pic>
-        <p:nvPicPr>
-          <p:cNvPr id="135" name="kd-tree-6.png"/>
-          <p:cNvPicPr>
-            <a:picLocks noChangeAspect="1"/>
-          </p:cNvPicPr>
-          <p:nvPr/>
-        </p:nvPicPr>
-        <p:blipFill>
-          <a:blip r:embed="rId3">
-            <a:extLst/>
-          </a:blip>
-          <a:stretch>
-            <a:fillRect/>
-          </a:stretch>
-        </p:blipFill>
-        <p:spPr>
-          <a:xfrm>
-            <a:off x="0" y="2597785"/>
-            <a:ext cx="4445000" cy="1662430"/>
-          </a:xfrm>
-          <a:prstGeom prst="rect">
-            <a:avLst/>
-          </a:prstGeom>
-          <a:ln w="12700">
-            <a:miter lim="400000"/>
-          </a:ln>
-        </p:spPr>
-      </p:pic>
-      <p:sp>
-        <p:nvSpPr>
-          <p:cNvPr id="136" name="Shape 136"/>
-          <p:cNvSpPr/>
-          <p:nvPr>
-            <p:ph type="body" idx="1"/>
-          </p:nvPr>
-        </p:nvSpPr>
-        <p:spPr>
-          <a:prstGeom prst="rect">
-            <a:avLst/>
-          </a:prstGeom>
-        </p:spPr>
-        <p:txBody>
-          <a:bodyPr/>
-          <a:lstStyle/>
-          <a:p>
-            <a:pPr marL="0" indent="0">
-              <a:buClrTx/>
-              <a:buSzTx/>
-              <a:buFontTx/>
-              <a:buNone/>
-              <a:defRPr sz="2500"/>
-            </a:pPr>
-            <a:r>
-              <a:t>Inserting 2D (x,y) coordinates:</a:t>
-            </a:r>
-            <a:br/>
-            <a:r>
-              <a:t>(7,2) (5,4) (2,3) (9,6) (4,7) </a:t>
-            </a:r>
-            <a:r>
-              <a:rPr>
-                <a:solidFill>
-                  <a:srgbClr val="942192"/>
-                </a:solidFill>
-              </a:rPr>
-              <a:t>(8,1)</a:t>
-            </a:r>
           </a:p>
         </p:txBody>
       </p:sp>
@@ -3722,7 +3693,28 @@
       </p:grpSpPr>
       <p:sp>
         <p:nvSpPr>
-          <p:cNvPr id="138" name="Shape 138"/>
+          <p:cNvPr id="141" name="Shape 141"/>
+          <p:cNvSpPr/>
+          <p:nvPr>
+            <p:ph type="body" idx="1"/>
+          </p:nvPr>
+        </p:nvSpPr>
+        <p:spPr>
+          <a:prstGeom prst="rect">
+            <a:avLst/>
+          </a:prstGeom>
+        </p:spPr>
+        <p:txBody>
+          <a:bodyPr/>
+          <a:lstStyle/>
+          <a:p>
+            <a:pPr/>
+          </a:p>
+        </p:txBody>
+      </p:sp>
+      <p:sp>
+        <p:nvSpPr>
+          <p:cNvPr id="142" name="Shape 142"/>
           <p:cNvSpPr/>
           <p:nvPr>
             <p:ph type="title"/>
@@ -3739,14 +3731,14 @@
           <a:p>
             <a:pPr/>
             <a:r>
-              <a:t>KD-Tree</a:t>
+              <a:t>Result</a:t>
             </a:r>
           </a:p>
         </p:txBody>
       </p:sp>
       <p:sp>
         <p:nvSpPr>
-          <p:cNvPr id="139" name="Shape 139"/>
+          <p:cNvPr id="143" name="Shape 143"/>
           <p:cNvSpPr/>
           <p:nvPr>
             <p:ph type="sldNum" sz="quarter" idx="4294967295"/>
@@ -3773,7 +3765,7 @@
       </p:sp>
       <p:pic>
         <p:nvPicPr>
-          <p:cNvPr id="140" name="kd-table-6.png"/>
+          <p:cNvPr id="144" name="image16.png"/>
           <p:cNvPicPr>
             <a:picLocks noChangeAspect="1"/>
           </p:cNvPicPr>
@@ -3789,8 +3781,8 @@
         </p:blipFill>
         <p:spPr>
           <a:xfrm>
-            <a:off x="4694521" y="1206500"/>
-            <a:ext cx="4445001" cy="4445000"/>
+            <a:off x="1605009" y="1629697"/>
+            <a:ext cx="5955958" cy="4466969"/>
           </a:xfrm>
           <a:prstGeom prst="rect">
             <a:avLst/>
@@ -3800,363 +3792,6 @@
           </a:ln>
         </p:spPr>
       </p:pic>
-      <p:pic>
-        <p:nvPicPr>
-          <p:cNvPr id="141" name="kd-tree-6.png"/>
-          <p:cNvPicPr>
-            <a:picLocks noChangeAspect="1"/>
-          </p:cNvPicPr>
-          <p:nvPr/>
-        </p:nvPicPr>
-        <p:blipFill>
-          <a:blip r:embed="rId3">
-            <a:extLst/>
-          </a:blip>
-          <a:stretch>
-            <a:fillRect/>
-          </a:stretch>
-        </p:blipFill>
-        <p:spPr>
-          <a:xfrm>
-            <a:off x="0" y="2597785"/>
-            <a:ext cx="4445000" cy="1662430"/>
-          </a:xfrm>
-          <a:prstGeom prst="rect">
-            <a:avLst/>
-          </a:prstGeom>
-          <a:ln w="12700">
-            <a:miter lim="400000"/>
-          </a:ln>
-        </p:spPr>
-      </p:pic>
-      <p:sp>
-        <p:nvSpPr>
-          <p:cNvPr id="142" name="Shape 142"/>
-          <p:cNvSpPr/>
-          <p:nvPr>
-            <p:ph type="body" idx="1"/>
-          </p:nvPr>
-        </p:nvSpPr>
-        <p:spPr>
-          <a:prstGeom prst="rect">
-            <a:avLst/>
-          </a:prstGeom>
-        </p:spPr>
-        <p:txBody>
-          <a:bodyPr/>
-          <a:lstStyle/>
-          <a:p>
-            <a:pPr marL="0" indent="0">
-              <a:buClrTx/>
-              <a:buSzTx/>
-              <a:buFontTx/>
-              <a:buNone/>
-              <a:defRPr sz="2500"/>
-            </a:pPr>
-            <a:r>
-              <a:t>Inserting 2D (x,y) coordinates:</a:t>
-            </a:r>
-            <a:br/>
-            <a:r>
-              <a:t>(7,2) (5,4) (2,3) (9,6) (4,7) (8,1)</a:t>
-            </a:r>
-          </a:p>
-        </p:txBody>
-      </p:sp>
-    </p:spTree>
-  </p:cSld>
-  <p:clrMapOvr>
-    <a:masterClrMapping/>
-  </p:clrMapOvr>
-  <p:transition xmlns:p14="http://schemas.microsoft.com/office/powerpoint/2010/main" spd="med" advClick="1" p14:dur="1000"/>
-</p:sld>
-</file>
-
-<file path=ppt/slides/slide16.xml><?xml version="1.0" encoding="utf-8"?>
-<p:sld xmlns:a="http://schemas.openxmlformats.org/drawingml/2006/main" xmlns:r="http://schemas.openxmlformats.org/officeDocument/2006/relationships" xmlns:p="http://schemas.openxmlformats.org/presentationml/2006/main" showMasterSp="1" showMasterPhAnim="1">
-  <p:cSld>
-    <p:spTree>
-      <p:nvGrpSpPr>
-        <p:cNvPr id="1" name=""/>
-        <p:cNvGrpSpPr/>
-        <p:nvPr/>
-      </p:nvGrpSpPr>
-      <p:grpSpPr>
-        <a:xfrm>
-          <a:off x="0" y="0"/>
-          <a:ext cx="0" cy="0"/>
-          <a:chOff x="0" y="0"/>
-          <a:chExt cx="0" cy="0"/>
-        </a:xfrm>
-      </p:grpSpPr>
-      <p:sp>
-        <p:nvSpPr>
-          <p:cNvPr id="144" name="Shape 144"/>
-          <p:cNvSpPr/>
-          <p:nvPr>
-            <p:ph type="body" idx="1"/>
-          </p:nvPr>
-        </p:nvSpPr>
-        <p:spPr>
-          <a:prstGeom prst="rect">
-            <a:avLst/>
-          </a:prstGeom>
-        </p:spPr>
-        <p:txBody>
-          <a:bodyPr/>
-          <a:lstStyle/>
-          <a:p>
-            <a:pPr/>
-          </a:p>
-        </p:txBody>
-      </p:sp>
-      <p:sp>
-        <p:nvSpPr>
-          <p:cNvPr id="145" name="Shape 145"/>
-          <p:cNvSpPr/>
-          <p:nvPr>
-            <p:ph type="title"/>
-          </p:nvPr>
-        </p:nvSpPr>
-        <p:spPr>
-          <a:prstGeom prst="rect">
-            <a:avLst/>
-          </a:prstGeom>
-        </p:spPr>
-        <p:txBody>
-          <a:bodyPr/>
-          <a:lstStyle/>
-          <a:p>
-            <a:pPr/>
-            <a:r>
-              <a:t>Appropriate parallelization of algorithms</a:t>
-            </a:r>
-          </a:p>
-        </p:txBody>
-      </p:sp>
-      <p:sp>
-        <p:nvSpPr>
-          <p:cNvPr id="146" name="Shape 146"/>
-          <p:cNvSpPr/>
-          <p:nvPr>
-            <p:ph type="sldNum" sz="quarter" idx="4294967295"/>
-          </p:nvPr>
-        </p:nvSpPr>
-        <p:spPr>
-          <a:prstGeom prst="rect">
-            <a:avLst/>
-          </a:prstGeom>
-          <a:extLst>
-            <a:ext uri="{C572A759-6A51-4108-AA02-DFA0A04FC94B}">
-              <ma14:wrappingTextBoxFlag xmlns:ma14="http://schemas.microsoft.com/office/mac/drawingml/2011/main" val="1"/>
-            </a:ext>
-          </a:extLst>
-        </p:spPr>
-        <p:txBody>
-          <a:bodyPr/>
-          <a:lstStyle/>
-          <a:p>
-            <a:pPr/>
-            <a:fld id="{86CB4B4D-7CA3-9044-876B-883B54F8677D}" type="slidenum"/>
-          </a:p>
-        </p:txBody>
-      </p:sp>
-    </p:spTree>
-  </p:cSld>
-  <p:clrMapOvr>
-    <a:masterClrMapping/>
-  </p:clrMapOvr>
-  <p:transition xmlns:p14="http://schemas.microsoft.com/office/powerpoint/2010/main" spd="med" advClick="1" p14:dur="1000"/>
-</p:sld>
-</file>
-
-<file path=ppt/slides/slide17.xml><?xml version="1.0" encoding="utf-8"?>
-<p:sld xmlns:a="http://schemas.openxmlformats.org/drawingml/2006/main" xmlns:r="http://schemas.openxmlformats.org/officeDocument/2006/relationships" xmlns:p="http://schemas.openxmlformats.org/presentationml/2006/main" showMasterSp="1" showMasterPhAnim="1">
-  <p:cSld>
-    <p:spTree>
-      <p:nvGrpSpPr>
-        <p:cNvPr id="1" name=""/>
-        <p:cNvGrpSpPr/>
-        <p:nvPr/>
-      </p:nvGrpSpPr>
-      <p:grpSpPr>
-        <a:xfrm>
-          <a:off x="0" y="0"/>
-          <a:ext cx="0" cy="0"/>
-          <a:chOff x="0" y="0"/>
-          <a:chExt cx="0" cy="0"/>
-        </a:xfrm>
-      </p:grpSpPr>
-      <p:sp>
-        <p:nvSpPr>
-          <p:cNvPr id="148" name="Shape 148"/>
-          <p:cNvSpPr/>
-          <p:nvPr>
-            <p:ph type="body" idx="1"/>
-          </p:nvPr>
-        </p:nvSpPr>
-        <p:spPr>
-          <a:prstGeom prst="rect">
-            <a:avLst/>
-          </a:prstGeom>
-        </p:spPr>
-        <p:txBody>
-          <a:bodyPr/>
-          <a:lstStyle/>
-          <a:p>
-            <a:pPr/>
-          </a:p>
-        </p:txBody>
-      </p:sp>
-      <p:sp>
-        <p:nvSpPr>
-          <p:cNvPr id="149" name="Shape 149"/>
-          <p:cNvSpPr/>
-          <p:nvPr>
-            <p:ph type="title"/>
-          </p:nvPr>
-        </p:nvSpPr>
-        <p:spPr>
-          <a:prstGeom prst="rect">
-            <a:avLst/>
-          </a:prstGeom>
-        </p:spPr>
-        <p:txBody>
-          <a:bodyPr/>
-          <a:lstStyle/>
-          <a:p>
-            <a:pPr/>
-            <a:r>
-              <a:t>Libraries and resources to be mentioned</a:t>
-            </a:r>
-          </a:p>
-        </p:txBody>
-      </p:sp>
-      <p:sp>
-        <p:nvSpPr>
-          <p:cNvPr id="150" name="Shape 150"/>
-          <p:cNvSpPr/>
-          <p:nvPr>
-            <p:ph type="sldNum" sz="quarter" idx="4294967295"/>
-          </p:nvPr>
-        </p:nvSpPr>
-        <p:spPr>
-          <a:prstGeom prst="rect">
-            <a:avLst/>
-          </a:prstGeom>
-          <a:extLst>
-            <a:ext uri="{C572A759-6A51-4108-AA02-DFA0A04FC94B}">
-              <ma14:wrappingTextBoxFlag xmlns:ma14="http://schemas.microsoft.com/office/mac/drawingml/2011/main" val="1"/>
-            </a:ext>
-          </a:extLst>
-        </p:spPr>
-        <p:txBody>
-          <a:bodyPr/>
-          <a:lstStyle/>
-          <a:p>
-            <a:pPr/>
-            <a:fld id="{86CB4B4D-7CA3-9044-876B-883B54F8677D}" type="slidenum"/>
-          </a:p>
-        </p:txBody>
-      </p:sp>
-    </p:spTree>
-  </p:cSld>
-  <p:clrMapOvr>
-    <a:masterClrMapping/>
-  </p:clrMapOvr>
-  <p:transition xmlns:p14="http://schemas.microsoft.com/office/powerpoint/2010/main" spd="med" advClick="1" p14:dur="1000"/>
-</p:sld>
-</file>
-
-<file path=ppt/slides/slide18.xml><?xml version="1.0" encoding="utf-8"?>
-<p:sld xmlns:a="http://schemas.openxmlformats.org/drawingml/2006/main" xmlns:r="http://schemas.openxmlformats.org/officeDocument/2006/relationships" xmlns:p="http://schemas.openxmlformats.org/presentationml/2006/main" showMasterSp="1" showMasterPhAnim="1">
-  <p:cSld>
-    <p:spTree>
-      <p:nvGrpSpPr>
-        <p:cNvPr id="1" name=""/>
-        <p:cNvGrpSpPr/>
-        <p:nvPr/>
-      </p:nvGrpSpPr>
-      <p:grpSpPr>
-        <a:xfrm>
-          <a:off x="0" y="0"/>
-          <a:ext cx="0" cy="0"/>
-          <a:chOff x="0" y="0"/>
-          <a:chExt cx="0" cy="0"/>
-        </a:xfrm>
-      </p:grpSpPr>
-      <p:sp>
-        <p:nvSpPr>
-          <p:cNvPr id="152" name="Shape 152"/>
-          <p:cNvSpPr/>
-          <p:nvPr>
-            <p:ph type="body" idx="1"/>
-          </p:nvPr>
-        </p:nvSpPr>
-        <p:spPr>
-          <a:prstGeom prst="rect">
-            <a:avLst/>
-          </a:prstGeom>
-        </p:spPr>
-        <p:txBody>
-          <a:bodyPr/>
-          <a:lstStyle/>
-          <a:p>
-            <a:pPr/>
-          </a:p>
-        </p:txBody>
-      </p:sp>
-      <p:sp>
-        <p:nvSpPr>
-          <p:cNvPr id="153" name="Shape 153"/>
-          <p:cNvSpPr/>
-          <p:nvPr>
-            <p:ph type="title"/>
-          </p:nvPr>
-        </p:nvSpPr>
-        <p:spPr>
-          <a:prstGeom prst="rect">
-            <a:avLst/>
-          </a:prstGeom>
-        </p:spPr>
-        <p:txBody>
-          <a:bodyPr/>
-          <a:lstStyle/>
-          <a:p>
-            <a:pPr/>
-            <a:r>
-              <a:t>Result</a:t>
-            </a:r>
-          </a:p>
-        </p:txBody>
-      </p:sp>
-      <p:sp>
-        <p:nvSpPr>
-          <p:cNvPr id="154" name="Shape 154"/>
-          <p:cNvSpPr/>
-          <p:nvPr>
-            <p:ph type="sldNum" sz="quarter" idx="4294967295"/>
-          </p:nvPr>
-        </p:nvSpPr>
-        <p:spPr>
-          <a:prstGeom prst="rect">
-            <a:avLst/>
-          </a:prstGeom>
-          <a:extLst>
-            <a:ext uri="{C572A759-6A51-4108-AA02-DFA0A04FC94B}">
-              <ma14:wrappingTextBoxFlag xmlns:ma14="http://schemas.microsoft.com/office/mac/drawingml/2011/main" val="1"/>
-            </a:ext>
-          </a:extLst>
-        </p:spPr>
-        <p:txBody>
-          <a:bodyPr/>
-          <a:lstStyle/>
-          <a:p>
-            <a:pPr/>
-            <a:fld id="{86CB4B4D-7CA3-9044-876B-883B54F8677D}" type="slidenum"/>
-          </a:p>
-        </p:txBody>
-      </p:sp>
     </p:spTree>
   </p:cSld>
   <p:clrMapOvr>
@@ -4185,7 +3820,7 @@
       </p:grpSpPr>
       <p:sp>
         <p:nvSpPr>
-          <p:cNvPr id="73" name="Shape 73"/>
+          <p:cNvPr id="74" name="Shape 74"/>
           <p:cNvSpPr/>
           <p:nvPr>
             <p:ph type="body" idx="1"/>
@@ -4200,13 +3835,28 @@
           <a:bodyPr/>
           <a:lstStyle/>
           <a:p>
-            <a:pPr/>
+            <a:pPr>
+              <a:lnSpc>
+                <a:spcPct val="120000"/>
+              </a:lnSpc>
+            </a:pPr>
             <a:r>
               <a:t>Path tracing does not produce significant caustics in a reasonable amount of time</a:t>
             </a:r>
           </a:p>
           <a:p>
-            <a:pPr/>
+            <a:pPr>
+              <a:lnSpc>
+                <a:spcPct val="120000"/>
+              </a:lnSpc>
+            </a:pPr>
+          </a:p>
+          <a:p>
+            <a:pPr>
+              <a:lnSpc>
+                <a:spcPct val="120000"/>
+              </a:lnSpc>
+            </a:pPr>
             <a:r>
               <a:t>Small probability that a ray starting from camera, hits a surface that actually reflects incoming rays directly through a transparent object to the light source</a:t>
             </a:r>
@@ -4215,7 +3865,7 @@
       </p:sp>
       <p:sp>
         <p:nvSpPr>
-          <p:cNvPr id="74" name="Shape 74"/>
+          <p:cNvPr id="75" name="Shape 75"/>
           <p:cNvSpPr/>
           <p:nvPr>
             <p:ph type="title"/>
@@ -4239,7 +3889,7 @@
       </p:sp>
       <p:sp>
         <p:nvSpPr>
-          <p:cNvPr id="75" name="Shape 75"/>
+          <p:cNvPr id="76" name="Shape 76"/>
           <p:cNvSpPr/>
           <p:nvPr>
             <p:ph type="sldNum" sz="quarter" idx="4294967295"/>
@@ -4296,7 +3946,7 @@
       </p:grpSpPr>
       <p:sp>
         <p:nvSpPr>
-          <p:cNvPr id="77" name="Shape 77"/>
+          <p:cNvPr id="78" name="Shape 78"/>
           <p:cNvSpPr/>
           <p:nvPr>
             <p:ph type="body" idx="1"/>
@@ -4311,19 +3961,45 @@
           <a:bodyPr/>
           <a:lstStyle/>
           <a:p>
-            <a:pPr/>
+            <a:pPr>
+              <a:lnSpc>
+                <a:spcPct val="120000"/>
+              </a:lnSpc>
+            </a:pPr>
             <a:r>
               <a:t>Collect additional information about light photons being emitted from the light source</a:t>
             </a:r>
           </a:p>
           <a:p>
-            <a:pPr/>
+            <a:pPr>
+              <a:lnSpc>
+                <a:spcPct val="120000"/>
+              </a:lnSpc>
+            </a:pPr>
+          </a:p>
+          <a:p>
+            <a:pPr>
+              <a:lnSpc>
+                <a:spcPct val="120000"/>
+              </a:lnSpc>
+            </a:pPr>
             <a:r>
               <a:t>Photons carry energy which can be transmitted whenever an object is hit</a:t>
             </a:r>
           </a:p>
           <a:p>
-            <a:pPr/>
+            <a:pPr>
+              <a:lnSpc>
+                <a:spcPct val="120000"/>
+              </a:lnSpc>
+            </a:pPr>
+          </a:p>
+          <a:p>
+            <a:pPr>
+              <a:lnSpc>
+                <a:spcPct val="120000"/>
+              </a:lnSpc>
+            </a:pPr>
             <a:r>
               <a:t>The process of storing photon→object interactions is called photon mapping</a:t>
             </a:r>
@@ -4332,7 +4008,7 @@
       </p:sp>
       <p:sp>
         <p:nvSpPr>
-          <p:cNvPr id="78" name="Shape 78"/>
+          <p:cNvPr id="79" name="Shape 79"/>
           <p:cNvSpPr/>
           <p:nvPr>
             <p:ph type="title"/>
@@ -4356,7 +4032,7 @@
       </p:sp>
       <p:sp>
         <p:nvSpPr>
-          <p:cNvPr id="79" name="Shape 79"/>
+          <p:cNvPr id="80" name="Shape 80"/>
           <p:cNvSpPr/>
           <p:nvPr>
             <p:ph type="sldNum" sz="quarter" idx="4294967295"/>
@@ -4413,7 +4089,7 @@
       </p:grpSpPr>
       <p:sp>
         <p:nvSpPr>
-          <p:cNvPr id="81" name="Shape 81"/>
+          <p:cNvPr id="82" name="Shape 82"/>
           <p:cNvSpPr/>
           <p:nvPr>
             <p:ph type="body" idx="1"/>
@@ -4432,32 +4108,82 @@
           <a:bodyPr/>
           <a:lstStyle/>
           <a:p>
-            <a:pPr/>
-            <a:r>
-              <a:t>Basically there are 2 steps involved:</a:t>
-            </a:r>
-          </a:p>
-          <a:p>
-            <a:pPr lvl="1" marL="800100" indent="-342900">
-              <a:buChar char="▪"/>
+            <a:pPr>
+              <a:defRPr sz="2600"/>
             </a:pPr>
             <a:r>
-              <a:t>Construction of the photon map</a:t>
-            </a:r>
-          </a:p>
-          <a:p>
-            <a:pPr lvl="1" marL="800100" indent="-342900">
-              <a:buChar char="▪"/>
+              <a:t>Photon mapping is a two pass technique</a:t>
+            </a:r>
+          </a:p>
+          <a:p>
+            <a:pPr>
+              <a:defRPr sz="2600"/>
             </a:pPr>
-            <a:r>
-              <a:t>Rendering</a:t>
+          </a:p>
+          <a:p>
+            <a:pPr marL="374315" indent="-374315">
+              <a:buClrTx/>
+              <a:buFontTx/>
+              <a:buAutoNum type="arabicPeriod" startAt="1"/>
+              <a:defRPr sz="2600"/>
+            </a:pPr>
+            <a:r>
+              <a:t>Photon tracing</a:t>
+            </a:r>
+          </a:p>
+          <a:p>
+            <a:pPr lvl="1">
+              <a:defRPr sz="2600"/>
+            </a:pPr>
+            <a:r>
+              <a:t>Follow photons from light into scene</a:t>
+            </a:r>
+          </a:p>
+          <a:p>
+            <a:pPr lvl="1">
+              <a:defRPr sz="2600"/>
+            </a:pPr>
+            <a:r>
+              <a:t>Save photons when colliding with diffuse objects</a:t>
+            </a:r>
+          </a:p>
+          <a:p>
+            <a:pPr lvl="1">
+              <a:defRPr sz="2600"/>
+            </a:pPr>
+          </a:p>
+          <a:p>
+            <a:pPr marL="374315" indent="-374315">
+              <a:buClrTx/>
+              <a:buFontTx/>
+              <a:buAutoNum type="arabicPeriod" startAt="1"/>
+              <a:defRPr sz="2600"/>
+            </a:pPr>
+            <a:r>
+              <a:t>Photon gathering</a:t>
+            </a:r>
+          </a:p>
+          <a:p>
+            <a:pPr lvl="1">
+              <a:defRPr sz="2600"/>
+            </a:pPr>
+            <a:r>
+              <a:t>Determine intersection point with e.g. raytracing</a:t>
+            </a:r>
+          </a:p>
+          <a:p>
+            <a:pPr lvl="1">
+              <a:defRPr sz="2600"/>
+            </a:pPr>
+            <a:r>
+              <a:t>Collect photons nearby to estimate incident flux</a:t>
             </a:r>
           </a:p>
         </p:txBody>
       </p:sp>
       <p:sp>
         <p:nvSpPr>
-          <p:cNvPr id="82" name="Shape 82"/>
+          <p:cNvPr id="83" name="Shape 83"/>
           <p:cNvSpPr/>
           <p:nvPr>
             <p:ph type="title"/>
@@ -4481,7 +4207,7 @@
       </p:sp>
       <p:sp>
         <p:nvSpPr>
-          <p:cNvPr id="83" name="Shape 83"/>
+          <p:cNvPr id="84" name="Shape 84"/>
           <p:cNvSpPr/>
           <p:nvPr>
             <p:ph type="sldNum" sz="quarter" idx="4294967295"/>
@@ -4538,17 +4264,13 @@
       </p:grpSpPr>
       <p:sp>
         <p:nvSpPr>
-          <p:cNvPr id="85" name="Shape 85"/>
+          <p:cNvPr id="86" name="Shape 86"/>
           <p:cNvSpPr/>
           <p:nvPr>
             <p:ph type="body" idx="1"/>
           </p:nvPr>
         </p:nvSpPr>
         <p:spPr>
-          <a:xfrm>
-            <a:off x="457200" y="1600200"/>
-            <a:ext cx="8229600" cy="4525963"/>
-          </a:xfrm>
           <a:prstGeom prst="rect">
             <a:avLst/>
           </a:prstGeom>
@@ -4557,34 +4279,76 @@
           <a:bodyPr/>
           <a:lstStyle/>
           <a:p>
-            <a:pPr/>
-            <a:r>
-              <a:t>Shooting photons from light in all directions</a:t>
-            </a:r>
-          </a:p>
-          <a:p>
-            <a:pPr/>
-            <a:r>
-              <a:t>Whenever a photon intersects with a surface, save intersection point and incoming direction in photon map</a:t>
-            </a:r>
-          </a:p>
-          <a:p>
-            <a:pPr/>
-            <a:r>
-              <a:t>Decide if photon gets reflected, transmitted or absorbed by chance</a:t>
-            </a:r>
-          </a:p>
-          <a:p>
-            <a:pPr/>
-            <a:r>
-              <a:t>The photon will not be traced any further once it has been absorbed</a:t>
+            <a:pPr marL="325754" indent="-325754" defTabSz="868680">
+              <a:lnSpc>
+                <a:spcPct val="200000"/>
+              </a:lnSpc>
+              <a:defRPr sz="2470"/>
+            </a:pPr>
+            <a:r>
+              <a:t>Enhanced path tracer</a:t>
+            </a:r>
+          </a:p>
+          <a:p>
+            <a:pPr marL="325754" indent="-325754" defTabSz="868680">
+              <a:lnSpc>
+                <a:spcPct val="200000"/>
+              </a:lnSpc>
+              <a:defRPr sz="2470"/>
+            </a:pPr>
+            <a:r>
+              <a:t>Photon mapping for handling indirect lighting</a:t>
+            </a:r>
+          </a:p>
+          <a:p>
+            <a:pPr marL="325754" indent="-325754" defTabSz="868680">
+              <a:lnSpc>
+                <a:spcPct val="200000"/>
+              </a:lnSpc>
+              <a:defRPr sz="2470"/>
+            </a:pPr>
+            <a:r>
+              <a:t>Shadow rays for direct lighting</a:t>
+            </a:r>
+          </a:p>
+          <a:p>
+            <a:pPr marL="325754" indent="-325754" defTabSz="868680">
+              <a:lnSpc>
+                <a:spcPct val="200000"/>
+              </a:lnSpc>
+              <a:defRPr sz="2470"/>
+            </a:pPr>
+            <a:r>
+              <a:t>Recursive ray tracing for specularity/transmission</a:t>
+            </a:r>
+          </a:p>
+          <a:p>
+            <a:pPr marL="325754" indent="-325754" defTabSz="868680">
+              <a:lnSpc>
+                <a:spcPct val="200000"/>
+              </a:lnSpc>
+              <a:defRPr sz="2470"/>
+            </a:pPr>
+            <a:r>
+              <a:t>Multithreaded photon map creation and ray casting</a:t>
+            </a:r>
+          </a:p>
+          <a:p>
+            <a:pPr marL="325754" indent="-325754" defTabSz="868680">
+              <a:lnSpc>
+                <a:spcPct val="200000"/>
+              </a:lnSpc>
+              <a:defRPr sz="2470"/>
+            </a:pPr>
+            <a:r>
+              <a:t>Per object Kd-tree for storing photons</a:t>
             </a:r>
           </a:p>
         </p:txBody>
       </p:sp>
       <p:sp>
         <p:nvSpPr>
-          <p:cNvPr id="86" name="Shape 86"/>
+          <p:cNvPr id="87" name="Shape 87"/>
           <p:cNvSpPr/>
           <p:nvPr>
             <p:ph type="title"/>
@@ -4601,14 +4365,14 @@
           <a:p>
             <a:pPr/>
             <a:r>
-              <a:t>Construction of the photon map</a:t>
+              <a:t>Implementation details</a:t>
             </a:r>
           </a:p>
         </p:txBody>
       </p:sp>
       <p:sp>
         <p:nvSpPr>
-          <p:cNvPr id="87" name="Shape 87"/>
+          <p:cNvPr id="88" name="Shape 88"/>
           <p:cNvSpPr/>
           <p:nvPr>
             <p:ph type="sldNum" sz="quarter" idx="4294967295"/>
@@ -4665,46 +4429,6 @@
       </p:grpSpPr>
       <p:sp>
         <p:nvSpPr>
-          <p:cNvPr id="89" name="Shape 89"/>
-          <p:cNvSpPr/>
-          <p:nvPr>
-            <p:ph type="body" idx="1"/>
-          </p:nvPr>
-        </p:nvSpPr>
-        <p:spPr>
-          <a:xfrm>
-            <a:off x="457200" y="1600200"/>
-            <a:ext cx="8229600" cy="4525963"/>
-          </a:xfrm>
-          <a:prstGeom prst="rect">
-            <a:avLst/>
-          </a:prstGeom>
-        </p:spPr>
-        <p:txBody>
-          <a:bodyPr/>
-          <a:lstStyle/>
-          <a:p>
-            <a:pPr/>
-            <a:r>
-              <a:t>Conventional photon mappers use ray tracing to determine direct illumination and extend it by adding indirect illumination on top</a:t>
-            </a:r>
-          </a:p>
-          <a:p>
-            <a:pPr/>
-            <a:r>
-              <a:t>At each intersection point that results from a ray hitting a surface during ray tracing, the nearest N photons will be determined</a:t>
-            </a:r>
-          </a:p>
-          <a:p>
-            <a:pPr/>
-            <a:r>
-              <a:t>Summing up the direct and indirect portions of illumination at all intersection points results in a globally illuminated scene</a:t>
-            </a:r>
-          </a:p>
-        </p:txBody>
-      </p:sp>
-      <p:sp>
-        <p:nvSpPr>
           <p:cNvPr id="90" name="Shape 90"/>
           <p:cNvSpPr/>
           <p:nvPr>
@@ -4722,7 +4446,7 @@
           <a:p>
             <a:pPr/>
             <a:r>
-              <a:t>Rendering</a:t>
+              <a:t>Kd-tree</a:t>
             </a:r>
           </a:p>
         </p:txBody>
@@ -4755,6 +4479,69 @@
           <a:p>
             <a:pPr/>
             <a:fld id="{86CB4B4D-7CA3-9044-876B-883B54F8677D}" type="slidenum"/>
+          </a:p>
+        </p:txBody>
+      </p:sp>
+      <p:pic>
+        <p:nvPicPr>
+          <p:cNvPr id="92" name="kd-table-0.png"/>
+          <p:cNvPicPr>
+            <a:picLocks noChangeAspect="1"/>
+          </p:cNvPicPr>
+          <p:nvPr/>
+        </p:nvPicPr>
+        <p:blipFill>
+          <a:blip r:embed="rId2">
+            <a:extLst/>
+          </a:blip>
+          <a:stretch>
+            <a:fillRect/>
+          </a:stretch>
+        </p:blipFill>
+        <p:spPr>
+          <a:xfrm>
+            <a:off x="4694521" y="1206500"/>
+            <a:ext cx="4445001" cy="4445000"/>
+          </a:xfrm>
+          <a:prstGeom prst="rect">
+            <a:avLst/>
+          </a:prstGeom>
+          <a:ln w="12700">
+            <a:miter lim="400000"/>
+          </a:ln>
+        </p:spPr>
+      </p:pic>
+      <p:sp>
+        <p:nvSpPr>
+          <p:cNvPr id="93" name="Shape 93"/>
+          <p:cNvSpPr/>
+          <p:nvPr>
+            <p:ph type="body" idx="1"/>
+          </p:nvPr>
+        </p:nvSpPr>
+        <p:spPr>
+          <a:prstGeom prst="rect">
+            <a:avLst/>
+          </a:prstGeom>
+        </p:spPr>
+        <p:txBody>
+          <a:bodyPr/>
+          <a:lstStyle/>
+          <a:p>
+            <a:pPr marL="0" indent="0">
+              <a:buClrTx/>
+              <a:buSzTx/>
+              <a:buFontTx/>
+              <a:buNone/>
+              <a:defRPr sz="2500"/>
+            </a:pPr>
+            <a:r>
+              <a:t>Inserting 2D (x,y) coordinates:</a:t>
+            </a:r>
+            <a:br/>
+            <a:r>
+              <a:t>(7,2) (5,4) (2,3) (9,6) (4,7) (8,1)</a:t>
+            </a:r>
           </a:p>
         </p:txBody>
       </p:sp>
@@ -4786,7 +4573,120 @@
       </p:grpSpPr>
       <p:sp>
         <p:nvSpPr>
-          <p:cNvPr id="93" name="Shape 93"/>
+          <p:cNvPr id="95" name="Shape 95"/>
+          <p:cNvSpPr/>
+          <p:nvPr>
+            <p:ph type="title"/>
+          </p:nvPr>
+        </p:nvSpPr>
+        <p:spPr>
+          <a:prstGeom prst="rect">
+            <a:avLst/>
+          </a:prstGeom>
+        </p:spPr>
+        <p:txBody>
+          <a:bodyPr/>
+          <a:lstStyle/>
+          <a:p>
+            <a:pPr/>
+            <a:r>
+              <a:t>Kd-tree</a:t>
+            </a:r>
+          </a:p>
+        </p:txBody>
+      </p:sp>
+      <p:sp>
+        <p:nvSpPr>
+          <p:cNvPr id="96" name="Shape 96"/>
+          <p:cNvSpPr/>
+          <p:nvPr>
+            <p:ph type="sldNum" sz="quarter" idx="4294967295"/>
+          </p:nvPr>
+        </p:nvSpPr>
+        <p:spPr>
+          <a:xfrm>
+            <a:off x="8502739" y="6568201"/>
+            <a:ext cx="184061" cy="269241"/>
+          </a:xfrm>
+          <a:prstGeom prst="rect">
+            <a:avLst/>
+          </a:prstGeom>
+          <a:extLst>
+            <a:ext uri="{C572A759-6A51-4108-AA02-DFA0A04FC94B}">
+              <ma14:wrappingTextBoxFlag xmlns:ma14="http://schemas.microsoft.com/office/mac/drawingml/2011/main" val="1"/>
+            </a:ext>
+          </a:extLst>
+        </p:spPr>
+        <p:txBody>
+          <a:bodyPr/>
+          <a:lstStyle/>
+          <a:p>
+            <a:pPr/>
+            <a:fld id="{86CB4B4D-7CA3-9044-876B-883B54F8677D}" type="slidenum"/>
+          </a:p>
+        </p:txBody>
+      </p:sp>
+      <p:pic>
+        <p:nvPicPr>
+          <p:cNvPr id="97" name="kd-table-1.png"/>
+          <p:cNvPicPr>
+            <a:picLocks noChangeAspect="1"/>
+          </p:cNvPicPr>
+          <p:nvPr/>
+        </p:nvPicPr>
+        <p:blipFill>
+          <a:blip r:embed="rId2">
+            <a:extLst/>
+          </a:blip>
+          <a:stretch>
+            <a:fillRect/>
+          </a:stretch>
+        </p:blipFill>
+        <p:spPr>
+          <a:xfrm>
+            <a:off x="4694521" y="1206500"/>
+            <a:ext cx="4445001" cy="4445000"/>
+          </a:xfrm>
+          <a:prstGeom prst="rect">
+            <a:avLst/>
+          </a:prstGeom>
+          <a:ln w="12700">
+            <a:miter lim="400000"/>
+          </a:ln>
+        </p:spPr>
+      </p:pic>
+      <p:pic>
+        <p:nvPicPr>
+          <p:cNvPr id="98" name="kd-tree-1.png"/>
+          <p:cNvPicPr>
+            <a:picLocks noChangeAspect="1"/>
+          </p:cNvPicPr>
+          <p:nvPr/>
+        </p:nvPicPr>
+        <p:blipFill>
+          <a:blip r:embed="rId3">
+            <a:extLst/>
+          </a:blip>
+          <a:stretch>
+            <a:fillRect/>
+          </a:stretch>
+        </p:blipFill>
+        <p:spPr>
+          <a:xfrm>
+            <a:off x="4189" y="3060064"/>
+            <a:ext cx="4445001" cy="737871"/>
+          </a:xfrm>
+          <a:prstGeom prst="rect">
+            <a:avLst/>
+          </a:prstGeom>
+          <a:ln w="12700">
+            <a:miter lim="400000"/>
+          </a:ln>
+        </p:spPr>
+      </p:pic>
+      <p:sp>
+        <p:nvSpPr>
+          <p:cNvPr id="99" name="Shape 99"/>
           <p:cNvSpPr/>
           <p:nvPr>
             <p:ph type="body" idx="1"/>
@@ -4801,62 +4701,28 @@
           <a:bodyPr/>
           <a:lstStyle/>
           <a:p>
-            <a:pPr/>
-          </a:p>
-        </p:txBody>
-      </p:sp>
-      <p:sp>
-        <p:nvSpPr>
-          <p:cNvPr id="94" name="Shape 94"/>
-          <p:cNvSpPr/>
-          <p:nvPr>
-            <p:ph type="title"/>
-          </p:nvPr>
-        </p:nvSpPr>
-        <p:spPr>
-          <a:prstGeom prst="rect">
-            <a:avLst/>
-          </a:prstGeom>
-        </p:spPr>
-        <p:txBody>
-          <a:bodyPr/>
-          <a:lstStyle/>
-          <a:p>
-            <a:pPr/>
-            <a:r>
-              <a:t>Implementation details</a:t>
-            </a:r>
-          </a:p>
-        </p:txBody>
-      </p:sp>
-      <p:sp>
-        <p:nvSpPr>
-          <p:cNvPr id="95" name="Shape 95"/>
-          <p:cNvSpPr/>
-          <p:nvPr>
-            <p:ph type="sldNum" sz="quarter" idx="4294967295"/>
-          </p:nvPr>
-        </p:nvSpPr>
-        <p:spPr>
-          <a:xfrm>
-            <a:off x="8502739" y="6568201"/>
-            <a:ext cx="184061" cy="269241"/>
-          </a:xfrm>
-          <a:prstGeom prst="rect">
-            <a:avLst/>
-          </a:prstGeom>
-          <a:extLst>
-            <a:ext uri="{C572A759-6A51-4108-AA02-DFA0A04FC94B}">
-              <ma14:wrappingTextBoxFlag xmlns:ma14="http://schemas.microsoft.com/office/mac/drawingml/2011/main" val="1"/>
-            </a:ext>
-          </a:extLst>
-        </p:spPr>
-        <p:txBody>
-          <a:bodyPr/>
-          <a:lstStyle/>
-          <a:p>
-            <a:pPr/>
-            <a:fld id="{86CB4B4D-7CA3-9044-876B-883B54F8677D}" type="slidenum"/>
+            <a:pPr marL="0" indent="0">
+              <a:buClrTx/>
+              <a:buSzTx/>
+              <a:buFontTx/>
+              <a:buNone/>
+              <a:defRPr sz="2500"/>
+            </a:pPr>
+            <a:r>
+              <a:t>Inserting 2D (x,y) coordinates:</a:t>
+            </a:r>
+            <a:br/>
+            <a:r>
+              <a:rPr>
+                <a:solidFill>
+                  <a:srgbClr val="942192"/>
+                </a:solidFill>
+              </a:rPr>
+              <a:t>(7,2)</a:t>
+            </a:r>
+            <a:r>
+              <a:t> (5,4) (2,3) (9,6) (4,7) (8,1)</a:t>
+            </a:r>
           </a:p>
         </p:txBody>
       </p:sp>
@@ -4888,7 +4754,7 @@
       </p:grpSpPr>
       <p:sp>
         <p:nvSpPr>
-          <p:cNvPr id="97" name="Shape 97"/>
+          <p:cNvPr id="101" name="Shape 101"/>
           <p:cNvSpPr/>
           <p:nvPr>
             <p:ph type="title"/>
@@ -4905,14 +4771,14 @@
           <a:p>
             <a:pPr/>
             <a:r>
-              <a:t>KD-Tree</a:t>
+              <a:t>Kd-tree</a:t>
             </a:r>
           </a:p>
         </p:txBody>
       </p:sp>
       <p:sp>
         <p:nvSpPr>
-          <p:cNvPr id="98" name="Shape 98"/>
+          <p:cNvPr id="102" name="Shape 102"/>
           <p:cNvSpPr/>
           <p:nvPr>
             <p:ph type="sldNum" sz="quarter" idx="4294967295"/>
@@ -4943,7 +4809,7 @@
       </p:sp>
       <p:pic>
         <p:nvPicPr>
-          <p:cNvPr id="99" name="kd-table-0.png"/>
+          <p:cNvPr id="103" name="kd-table-2.png"/>
           <p:cNvPicPr>
             <a:picLocks noChangeAspect="1"/>
           </p:cNvPicPr>
@@ -4970,9 +4836,38 @@
           </a:ln>
         </p:spPr>
       </p:pic>
+      <p:pic>
+        <p:nvPicPr>
+          <p:cNvPr id="104" name="kd-tree-2.png"/>
+          <p:cNvPicPr>
+            <a:picLocks noChangeAspect="1"/>
+          </p:cNvPicPr>
+          <p:nvPr/>
+        </p:nvPicPr>
+        <p:blipFill>
+          <a:blip r:embed="rId3">
+            <a:extLst/>
+          </a:blip>
+          <a:stretch>
+            <a:fillRect/>
+          </a:stretch>
+        </p:blipFill>
+        <p:spPr>
+          <a:xfrm>
+            <a:off x="5989" y="2691129"/>
+            <a:ext cx="4445001" cy="1475741"/>
+          </a:xfrm>
+          <a:prstGeom prst="rect">
+            <a:avLst/>
+          </a:prstGeom>
+          <a:ln w="12700">
+            <a:miter lim="400000"/>
+          </a:ln>
+        </p:spPr>
+      </p:pic>
       <p:sp>
         <p:nvSpPr>
-          <p:cNvPr id="100" name="Shape 100"/>
+          <p:cNvPr id="105" name="Shape 105"/>
           <p:cNvSpPr/>
           <p:nvPr>
             <p:ph type="body" idx="1"/>
@@ -4999,7 +4894,18 @@
             </a:r>
             <a:br/>
             <a:r>
-              <a:t>(7,2) (5,4) (2,3) (9,6) (4,7) (8,1)</a:t>
+              <a:t>(7,2) </a:t>
+            </a:r>
+            <a:r>
+              <a:rPr>
+                <a:solidFill>
+                  <a:srgbClr val="942192"/>
+                </a:solidFill>
+              </a:rPr>
+              <a:t>(5,4)</a:t>
+            </a:r>
+            <a:r>
+              <a:t> (2,3) (9,6) (4,7) (8,1)</a:t>
             </a:r>
           </a:p>
         </p:txBody>
@@ -5032,7 +4938,7 @@
       </p:grpSpPr>
       <p:sp>
         <p:nvSpPr>
-          <p:cNvPr id="102" name="Shape 102"/>
+          <p:cNvPr id="107" name="Shape 107"/>
           <p:cNvSpPr/>
           <p:nvPr>
             <p:ph type="title"/>
@@ -5049,14 +4955,14 @@
           <a:p>
             <a:pPr/>
             <a:r>
-              <a:t>KD-Tree</a:t>
+              <a:t>Kd-tree</a:t>
             </a:r>
           </a:p>
         </p:txBody>
       </p:sp>
       <p:sp>
         <p:nvSpPr>
-          <p:cNvPr id="103" name="Shape 103"/>
+          <p:cNvPr id="108" name="Shape 108"/>
           <p:cNvSpPr/>
           <p:nvPr>
             <p:ph type="sldNum" sz="quarter" idx="4294967295"/>
@@ -5087,7 +4993,7 @@
       </p:sp>
       <p:pic>
         <p:nvPicPr>
-          <p:cNvPr id="104" name="kd-table-1.png"/>
+          <p:cNvPr id="109" name="kd-table-3.png"/>
           <p:cNvPicPr>
             <a:picLocks noChangeAspect="1"/>
           </p:cNvPicPr>
@@ -5116,7 +5022,7 @@
       </p:pic>
       <p:pic>
         <p:nvPicPr>
-          <p:cNvPr id="105" name="kd-tree-1.png"/>
+          <p:cNvPr id="110" name="kd-tree-3.png"/>
           <p:cNvPicPr>
             <a:picLocks noChangeAspect="1"/>
           </p:cNvPicPr>
@@ -5132,8 +5038,8 @@
         </p:blipFill>
         <p:spPr>
           <a:xfrm>
-            <a:off x="4189" y="3060064"/>
-            <a:ext cx="4445001" cy="737871"/>
+            <a:off x="0" y="2322195"/>
+            <a:ext cx="4445000" cy="2213611"/>
           </a:xfrm>
           <a:prstGeom prst="rect">
             <a:avLst/>
@@ -5145,7 +5051,7 @@
       </p:pic>
       <p:sp>
         <p:nvSpPr>
-          <p:cNvPr id="106" name="Shape 106"/>
+          <p:cNvPr id="111" name="Shape 111"/>
           <p:cNvSpPr/>
           <p:nvPr>
             <p:ph type="body" idx="1"/>
@@ -5172,15 +5078,18 @@
             </a:r>
             <a:br/>
             <a:r>
+              <a:t>(7,2) (5,4) </a:t>
+            </a:r>
+            <a:r>
               <a:rPr>
                 <a:solidFill>
                   <a:srgbClr val="942192"/>
                 </a:solidFill>
               </a:rPr>
-              <a:t>(7,2)</a:t>
-            </a:r>
-            <a:r>
-              <a:t> (5,4) (2,3) (9,6) (4,7) (8,1)</a:t>
+              <a:t>(2,3)</a:t>
+            </a:r>
+            <a:r>
+              <a:t> (9,6) (4,7) (8,1)</a:t>
             </a:r>
           </a:p>
         </p:txBody>

</xml_diff>